<commit_message>
Ajout d'un exemple de syntaxe enchainée
</commit_message>
<xml_diff>
--- a/Introduction_EDA_R.pptx
+++ b/Introduction_EDA_R.pptx
@@ -24012,13 +24012,13 @@
             <p:ph idx="1"/>
             <p:extLst>
               <p:ext uri="{D42A27DB-BD31-4B8C-83A1-F6EECF244321}">
-                <p14:modId xmlns:p14="http://schemas.microsoft.com/office/powerpoint/2010/main" val="2745380034"/>
+                <p14:modId xmlns:p14="http://schemas.microsoft.com/office/powerpoint/2010/main" val="1955329903"/>
               </p:ext>
             </p:extLst>
           </p:nvPr>
         </p:nvGraphicFramePr>
         <p:xfrm>
-          <a:off x="1012032" y="2626368"/>
+          <a:off x="833613" y="2302983"/>
           <a:ext cx="10167936" cy="4191000"/>
         </p:xfrm>
         <a:graphic>

</xml_diff>

<commit_message>
Document quarto v1 complet
</commit_message>
<xml_diff>
--- a/Introduction_EDA_R.pptx
+++ b/Introduction_EDA_R.pptx
@@ -11984,7 +11984,7 @@
           <a:p>
             <a:fld id="{95F3A9C0-D7C5-1F4F-9ADD-323C3EAE9429}" type="datetimeFigureOut">
               <a:rPr lang="fr-CA" smtClean="0"/>
-              <a:t>2023-02-15</a:t>
+              <a:t>2023-02-16</a:t>
             </a:fld>
             <a:endParaRPr lang="fr-CA"/>
           </a:p>
@@ -12514,7 +12514,7 @@
           <a:p>
             <a:fld id="{02AC24A9-CCB6-4F8D-B8DB-C2F3692CFA5A}" type="datetimeFigureOut">
               <a:rPr lang="en-US" smtClean="0"/>
-              <a:t>2/15/23</a:t>
+              <a:t>2/16/23</a:t>
             </a:fld>
             <a:endParaRPr lang="en-US" dirty="0"/>
           </a:p>
@@ -12884,7 +12884,7 @@
           <a:p>
             <a:fld id="{02AC24A9-CCB6-4F8D-B8DB-C2F3692CFA5A}" type="datetimeFigureOut">
               <a:rPr lang="en-US" smtClean="0"/>
-              <a:t>2/15/23</a:t>
+              <a:t>2/16/23</a:t>
             </a:fld>
             <a:endParaRPr lang="en-US"/>
           </a:p>
@@ -13093,7 +13093,7 @@
           <a:p>
             <a:fld id="{02AC24A9-CCB6-4F8D-B8DB-C2F3692CFA5A}" type="datetimeFigureOut">
               <a:rPr lang="en-US" smtClean="0"/>
-              <a:t>2/15/23</a:t>
+              <a:t>2/16/23</a:t>
             </a:fld>
             <a:endParaRPr lang="en-US"/>
           </a:p>
@@ -13563,7 +13563,7 @@
           <a:p>
             <a:fld id="{02AC24A9-CCB6-4F8D-B8DB-C2F3692CFA5A}" type="datetimeFigureOut">
               <a:rPr lang="en-US" smtClean="0"/>
-              <a:t>2/15/23</a:t>
+              <a:t>2/16/23</a:t>
             </a:fld>
             <a:endParaRPr lang="en-US"/>
           </a:p>
@@ -14017,7 +14017,7 @@
           <a:p>
             <a:fld id="{02AC24A9-CCB6-4F8D-B8DB-C2F3692CFA5A}" type="datetimeFigureOut">
               <a:rPr lang="en-US" smtClean="0"/>
-              <a:t>2/15/23</a:t>
+              <a:t>2/16/23</a:t>
             </a:fld>
             <a:endParaRPr lang="en-US"/>
           </a:p>
@@ -14549,7 +14549,7 @@
           <a:p>
             <a:fld id="{02AC24A9-CCB6-4F8D-B8DB-C2F3692CFA5A}" type="datetimeFigureOut">
               <a:rPr lang="en-US" smtClean="0"/>
-              <a:t>2/15/23</a:t>
+              <a:t>2/16/23</a:t>
             </a:fld>
             <a:endParaRPr lang="en-US"/>
           </a:p>
@@ -15248,7 +15248,7 @@
           <a:p>
             <a:fld id="{02AC24A9-CCB6-4F8D-B8DB-C2F3692CFA5A}" type="datetimeFigureOut">
               <a:rPr lang="en-US" smtClean="0"/>
-              <a:t>2/15/23</a:t>
+              <a:t>2/16/23</a:t>
             </a:fld>
             <a:endParaRPr lang="en-US"/>
           </a:p>
@@ -15577,7 +15577,7 @@
           <a:p>
             <a:fld id="{02AC24A9-CCB6-4F8D-B8DB-C2F3692CFA5A}" type="datetimeFigureOut">
               <a:rPr lang="en-US" smtClean="0"/>
-              <a:t>2/15/23</a:t>
+              <a:t>2/16/23</a:t>
             </a:fld>
             <a:endParaRPr lang="en-US"/>
           </a:p>
@@ -15690,7 +15690,7 @@
           <a:p>
             <a:fld id="{02AC24A9-CCB6-4F8D-B8DB-C2F3692CFA5A}" type="datetimeFigureOut">
               <a:rPr lang="en-US" smtClean="0"/>
-              <a:t>2/15/23</a:t>
+              <a:t>2/16/23</a:t>
             </a:fld>
             <a:endParaRPr lang="en-US"/>
           </a:p>
@@ -16185,7 +16185,7 @@
           <a:p>
             <a:fld id="{02AC24A9-CCB6-4F8D-B8DB-C2F3692CFA5A}" type="datetimeFigureOut">
               <a:rPr lang="en-US" smtClean="0"/>
-              <a:t>2/15/23</a:t>
+              <a:t>2/16/23</a:t>
             </a:fld>
             <a:endParaRPr lang="en-US" dirty="0"/>
           </a:p>
@@ -16662,7 +16662,7 @@
           <a:p>
             <a:fld id="{02AC24A9-CCB6-4F8D-B8DB-C2F3692CFA5A}" type="datetimeFigureOut">
               <a:rPr lang="en-US" smtClean="0"/>
-              <a:t>2/15/23</a:t>
+              <a:t>2/16/23</a:t>
             </a:fld>
             <a:endParaRPr lang="en-US"/>
           </a:p>
@@ -16905,7 +16905,7 @@
           <a:p>
             <a:fld id="{02AC24A9-CCB6-4F8D-B8DB-C2F3692CFA5A}" type="datetimeFigureOut">
               <a:rPr lang="en-US" smtClean="0"/>
-              <a:t>2/15/23</a:t>
+              <a:t>2/16/23</a:t>
             </a:fld>
             <a:endParaRPr lang="en-US"/>
           </a:p>
@@ -25630,14 +25630,14 @@
             <p:ph idx="1"/>
             <p:extLst>
               <p:ext uri="{D42A27DB-BD31-4B8C-83A1-F6EECF244321}">
-                <p14:modId xmlns:p14="http://schemas.microsoft.com/office/powerpoint/2010/main" val="1955329903"/>
+                <p14:modId xmlns:p14="http://schemas.microsoft.com/office/powerpoint/2010/main" val="1950553822"/>
               </p:ext>
             </p:extLst>
           </p:nvPr>
         </p:nvGraphicFramePr>
         <p:xfrm>
           <a:off x="833613" y="2302983"/>
-          <a:ext cx="10167936" cy="4191000"/>
+          <a:ext cx="10167936" cy="3550920"/>
         </p:xfrm>
         <a:graphic>
           <a:graphicData uri="http://schemas.openxmlformats.org/drawingml/2006/table">
@@ -25741,159 +25741,6 @@
                 <a:extLst>
                   <a:ext uri="{0D108BD9-81ED-4DB2-BD59-A6C34878D82A}">
                     <a16:rowId xmlns:a16="http://schemas.microsoft.com/office/drawing/2014/main" val="3440272393"/>
-                  </a:ext>
-                </a:extLst>
-              </a:tr>
-              <a:tr h="370840">
-                <a:tc>
-                  <a:txBody>
-                    <a:bodyPr/>
-                    <a:lstStyle/>
-                    <a:p>
-                      <a:r>
-                        <a:rPr lang="fr-CA" dirty="0" err="1">
-                          <a:latin typeface="American Typewriter" panose="02090604020004020304" pitchFamily="18" charset="77"/>
-                        </a:rPr>
-                        <a:t>getwd</a:t>
-                      </a:r>
-                      <a:r>
-                        <a:rPr lang="fr-CA" dirty="0">
-                          <a:latin typeface="American Typewriter" panose="02090604020004020304" pitchFamily="18" charset="77"/>
-                        </a:rPr>
-                        <a:t>( ) et </a:t>
-                      </a:r>
-                      <a:r>
-                        <a:rPr lang="fr-CA" dirty="0" err="1">
-                          <a:latin typeface="American Typewriter" panose="02090604020004020304" pitchFamily="18" charset="77"/>
-                        </a:rPr>
-                        <a:t>setwd</a:t>
-                      </a:r>
-                      <a:r>
-                        <a:rPr lang="fr-CA" dirty="0">
-                          <a:latin typeface="American Typewriter" panose="02090604020004020304" pitchFamily="18" charset="77"/>
-                        </a:rPr>
-                        <a:t>( )</a:t>
-                      </a:r>
-                    </a:p>
-                  </a:txBody>
-                  <a:tcPr/>
-                </a:tc>
-                <a:tc>
-                  <a:txBody>
-                    <a:bodyPr/>
-                    <a:lstStyle/>
-                    <a:p>
-                      <a:r>
-                        <a:rPr lang="fr-CA" dirty="0">
-                          <a:latin typeface="American Typewriter" panose="02090604020004020304" pitchFamily="18" charset="77"/>
-                        </a:rPr>
-                        <a:t>Chemin du répertoire de travail</a:t>
-                      </a:r>
-                    </a:p>
-                  </a:txBody>
-                  <a:tcPr/>
-                </a:tc>
-                <a:tc>
-                  <a:txBody>
-                    <a:bodyPr/>
-                    <a:lstStyle/>
-                    <a:p>
-                      <a:pPr marL="0" marR="0" lvl="0" indent="0" algn="l" defTabSz="914400" rtl="0" eaLnBrk="1" fontAlgn="auto" latinLnBrk="0" hangingPunct="1">
-                        <a:lnSpc>
-                          <a:spcPct val="100000"/>
-                        </a:lnSpc>
-                        <a:spcBef>
-                          <a:spcPts val="0"/>
-                        </a:spcBef>
-                        <a:spcAft>
-                          <a:spcPts val="0"/>
-                        </a:spcAft>
-                        <a:buClrTx/>
-                        <a:buSzTx/>
-                        <a:buFontTx/>
-                        <a:buNone/>
-                        <a:tabLst/>
-                        <a:defRPr/>
-                      </a:pPr>
-                      <a:r>
-                        <a:rPr lang="fr-CA" dirty="0" err="1">
-                          <a:latin typeface="American Typewriter" panose="02090604020004020304" pitchFamily="18" charset="77"/>
-                        </a:rPr>
-                        <a:t>setwd</a:t>
-                      </a:r>
-                      <a:r>
-                        <a:rPr lang="fr-CA" dirty="0">
-                          <a:latin typeface="American Typewriter" panose="02090604020004020304" pitchFamily="18" charset="77"/>
-                        </a:rPr>
-                        <a:t>("</a:t>
-                      </a:r>
-                      <a:r>
-                        <a:rPr lang="fr-CA" sz="1800" kern="1200" dirty="0">
-                          <a:solidFill>
-                            <a:schemeClr val="tx1"/>
-                          </a:solidFill>
-                          <a:effectLst/>
-                          <a:latin typeface="American Typewriter" panose="02090604020004020304" pitchFamily="18" charset="77"/>
-                          <a:ea typeface="+mn-ea"/>
-                          <a:cs typeface="+mn-cs"/>
-                        </a:rPr>
-                        <a:t>/</a:t>
-                      </a:r>
-                      <a:r>
-                        <a:rPr lang="fr-CA" sz="1800" kern="1200" dirty="0" err="1">
-                          <a:solidFill>
-                            <a:schemeClr val="tx1"/>
-                          </a:solidFill>
-                          <a:effectLst/>
-                          <a:latin typeface="American Typewriter" panose="02090604020004020304" pitchFamily="18" charset="77"/>
-                          <a:ea typeface="+mn-ea"/>
-                          <a:cs typeface="+mn-cs"/>
-                        </a:rPr>
-                        <a:t>Users</a:t>
-                      </a:r>
-                      <a:r>
-                        <a:rPr lang="fr-CA" sz="1800" kern="1200" dirty="0">
-                          <a:solidFill>
-                            <a:schemeClr val="tx1"/>
-                          </a:solidFill>
-                          <a:effectLst/>
-                          <a:latin typeface="American Typewriter" panose="02090604020004020304" pitchFamily="18" charset="77"/>
-                          <a:ea typeface="+mn-ea"/>
-                          <a:cs typeface="+mn-cs"/>
-                        </a:rPr>
-                        <a:t>/</a:t>
-                      </a:r>
-                      <a:r>
-                        <a:rPr lang="fr-CA" sz="1800" kern="1200" dirty="0" err="1">
-                          <a:solidFill>
-                            <a:schemeClr val="tx1"/>
-                          </a:solidFill>
-                          <a:effectLst/>
-                          <a:latin typeface="American Typewriter" panose="02090604020004020304" pitchFamily="18" charset="77"/>
-                          <a:ea typeface="+mn-ea"/>
-                          <a:cs typeface="+mn-cs"/>
-                        </a:rPr>
-                        <a:t>pascalbrissette</a:t>
-                      </a:r>
-                      <a:r>
-                        <a:rPr lang="fr-CA" sz="1800" kern="1200" dirty="0">
-                          <a:solidFill>
-                            <a:schemeClr val="tx1"/>
-                          </a:solidFill>
-                          <a:effectLst/>
-                          <a:latin typeface="American Typewriter" panose="02090604020004020304" pitchFamily="18" charset="77"/>
-                          <a:ea typeface="+mn-ea"/>
-                          <a:cs typeface="+mn-cs"/>
-                        </a:rPr>
-                        <a:t>")</a:t>
-                      </a:r>
-                    </a:p>
-                  </a:txBody>
-                  <a:tcPr/>
-                </a:tc>
-                <a:extLst>
-                  <a:ext uri="{0D108BD9-81ED-4DB2-BD59-A6C34878D82A}">
-                    <a16:rowId xmlns:a16="http://schemas.microsoft.com/office/drawing/2014/main" val="2551363251"/>
                   </a:ext>
                 </a:extLst>
               </a:tr>

</xml_diff>

<commit_message>
Ajout de diapositives dans la présentation
</commit_message>
<xml_diff>
--- a/Introduction_EDA_R.pptx
+++ b/Introduction_EDA_R.pptx
@@ -5,7 +5,7 @@
     <p:sldMasterId id="2147483710" r:id="rId1"/>
   </p:sldMasterIdLst>
   <p:notesMasterIdLst>
-    <p:notesMasterId r:id="rId26"/>
+    <p:notesMasterId r:id="rId28"/>
   </p:notesMasterIdLst>
   <p:sldIdLst>
     <p:sldId id="256" r:id="rId2"/>
@@ -18,20 +18,22 @@
     <p:sldId id="288" r:id="rId9"/>
     <p:sldId id="289" r:id="rId10"/>
     <p:sldId id="316" r:id="rId11"/>
-    <p:sldId id="323" r:id="rId12"/>
-    <p:sldId id="322" r:id="rId13"/>
-    <p:sldId id="321" r:id="rId14"/>
-    <p:sldId id="313" r:id="rId15"/>
-    <p:sldId id="324" r:id="rId16"/>
-    <p:sldId id="325" r:id="rId17"/>
-    <p:sldId id="326" r:id="rId18"/>
-    <p:sldId id="327" r:id="rId19"/>
-    <p:sldId id="315" r:id="rId20"/>
-    <p:sldId id="320" r:id="rId21"/>
-    <p:sldId id="314" r:id="rId22"/>
-    <p:sldId id="318" r:id="rId23"/>
-    <p:sldId id="319" r:id="rId24"/>
-    <p:sldId id="309" r:id="rId25"/>
+    <p:sldId id="328" r:id="rId12"/>
+    <p:sldId id="323" r:id="rId13"/>
+    <p:sldId id="322" r:id="rId14"/>
+    <p:sldId id="321" r:id="rId15"/>
+    <p:sldId id="313" r:id="rId16"/>
+    <p:sldId id="324" r:id="rId17"/>
+    <p:sldId id="325" r:id="rId18"/>
+    <p:sldId id="326" r:id="rId19"/>
+    <p:sldId id="327" r:id="rId20"/>
+    <p:sldId id="315" r:id="rId21"/>
+    <p:sldId id="320" r:id="rId22"/>
+    <p:sldId id="314" r:id="rId23"/>
+    <p:sldId id="318" r:id="rId24"/>
+    <p:sldId id="319" r:id="rId25"/>
+    <p:sldId id="329" r:id="rId26"/>
+    <p:sldId id="309" r:id="rId27"/>
   </p:sldIdLst>
   <p:sldSz cx="12192000" cy="6858000"/>
   <p:notesSz cx="6858000" cy="9144000"/>
@@ -145,6 +147,7 @@
             <p14:sldId id="288"/>
             <p14:sldId id="289"/>
             <p14:sldId id="316"/>
+            <p14:sldId id="328"/>
             <p14:sldId id="323"/>
             <p14:sldId id="322"/>
             <p14:sldId id="321"/>
@@ -158,6 +161,7 @@
             <p14:sldId id="314"/>
             <p14:sldId id="318"/>
             <p14:sldId id="319"/>
+            <p14:sldId id="329"/>
             <p14:sldId id="309"/>
           </p14:sldIdLst>
         </p14:section>
@@ -11984,7 +11988,7 @@
           <a:p>
             <a:fld id="{95F3A9C0-D7C5-1F4F-9ADD-323C3EAE9429}" type="datetimeFigureOut">
               <a:rPr lang="fr-CA" smtClean="0"/>
-              <a:t>2023-02-16</a:t>
+              <a:t>2023-02-20</a:t>
             </a:fld>
             <a:endParaRPr lang="fr-CA"/>
           </a:p>
@@ -12339,7 +12343,7 @@
           <a:p>
             <a:fld id="{5AF06E3D-D3AF-974B-B662-9B3DFC1298AA}" type="slidenum">
               <a:rPr lang="fr-CA" smtClean="0"/>
-              <a:t>22</a:t>
+              <a:t>23</a:t>
             </a:fld>
             <a:endParaRPr lang="fr-CA"/>
           </a:p>
@@ -12514,7 +12518,7 @@
           <a:p>
             <a:fld id="{02AC24A9-CCB6-4F8D-B8DB-C2F3692CFA5A}" type="datetimeFigureOut">
               <a:rPr lang="en-US" smtClean="0"/>
-              <a:t>2/16/23</a:t>
+              <a:t>2/20/23</a:t>
             </a:fld>
             <a:endParaRPr lang="en-US" dirty="0"/>
           </a:p>
@@ -12884,7 +12888,7 @@
           <a:p>
             <a:fld id="{02AC24A9-CCB6-4F8D-B8DB-C2F3692CFA5A}" type="datetimeFigureOut">
               <a:rPr lang="en-US" smtClean="0"/>
-              <a:t>2/16/23</a:t>
+              <a:t>2/20/23</a:t>
             </a:fld>
             <a:endParaRPr lang="en-US"/>
           </a:p>
@@ -13093,7 +13097,7 @@
           <a:p>
             <a:fld id="{02AC24A9-CCB6-4F8D-B8DB-C2F3692CFA5A}" type="datetimeFigureOut">
               <a:rPr lang="en-US" smtClean="0"/>
-              <a:t>2/16/23</a:t>
+              <a:t>2/20/23</a:t>
             </a:fld>
             <a:endParaRPr lang="en-US"/>
           </a:p>
@@ -13563,7 +13567,7 @@
           <a:p>
             <a:fld id="{02AC24A9-CCB6-4F8D-B8DB-C2F3692CFA5A}" type="datetimeFigureOut">
               <a:rPr lang="en-US" smtClean="0"/>
-              <a:t>2/16/23</a:t>
+              <a:t>2/20/23</a:t>
             </a:fld>
             <a:endParaRPr lang="en-US"/>
           </a:p>
@@ -14017,7 +14021,7 @@
           <a:p>
             <a:fld id="{02AC24A9-CCB6-4F8D-B8DB-C2F3692CFA5A}" type="datetimeFigureOut">
               <a:rPr lang="en-US" smtClean="0"/>
-              <a:t>2/16/23</a:t>
+              <a:t>2/20/23</a:t>
             </a:fld>
             <a:endParaRPr lang="en-US"/>
           </a:p>
@@ -14549,7 +14553,7 @@
           <a:p>
             <a:fld id="{02AC24A9-CCB6-4F8D-B8DB-C2F3692CFA5A}" type="datetimeFigureOut">
               <a:rPr lang="en-US" smtClean="0"/>
-              <a:t>2/16/23</a:t>
+              <a:t>2/20/23</a:t>
             </a:fld>
             <a:endParaRPr lang="en-US"/>
           </a:p>
@@ -15248,7 +15252,7 @@
           <a:p>
             <a:fld id="{02AC24A9-CCB6-4F8D-B8DB-C2F3692CFA5A}" type="datetimeFigureOut">
               <a:rPr lang="en-US" smtClean="0"/>
-              <a:t>2/16/23</a:t>
+              <a:t>2/20/23</a:t>
             </a:fld>
             <a:endParaRPr lang="en-US"/>
           </a:p>
@@ -15577,7 +15581,7 @@
           <a:p>
             <a:fld id="{02AC24A9-CCB6-4F8D-B8DB-C2F3692CFA5A}" type="datetimeFigureOut">
               <a:rPr lang="en-US" smtClean="0"/>
-              <a:t>2/16/23</a:t>
+              <a:t>2/20/23</a:t>
             </a:fld>
             <a:endParaRPr lang="en-US"/>
           </a:p>
@@ -15690,7 +15694,7 @@
           <a:p>
             <a:fld id="{02AC24A9-CCB6-4F8D-B8DB-C2F3692CFA5A}" type="datetimeFigureOut">
               <a:rPr lang="en-US" smtClean="0"/>
-              <a:t>2/16/23</a:t>
+              <a:t>2/20/23</a:t>
             </a:fld>
             <a:endParaRPr lang="en-US"/>
           </a:p>
@@ -16185,7 +16189,7 @@
           <a:p>
             <a:fld id="{02AC24A9-CCB6-4F8D-B8DB-C2F3692CFA5A}" type="datetimeFigureOut">
               <a:rPr lang="en-US" smtClean="0"/>
-              <a:t>2/16/23</a:t>
+              <a:t>2/20/23</a:t>
             </a:fld>
             <a:endParaRPr lang="en-US" dirty="0"/>
           </a:p>
@@ -16662,7 +16666,7 @@
           <a:p>
             <a:fld id="{02AC24A9-CCB6-4F8D-B8DB-C2F3692CFA5A}" type="datetimeFigureOut">
               <a:rPr lang="en-US" smtClean="0"/>
-              <a:t>2/16/23</a:t>
+              <a:t>2/20/23</a:t>
             </a:fld>
             <a:endParaRPr lang="en-US"/>
           </a:p>
@@ -16905,7 +16909,7 @@
           <a:p>
             <a:fld id="{02AC24A9-CCB6-4F8D-B8DB-C2F3692CFA5A}" type="datetimeFigureOut">
               <a:rPr lang="en-US" smtClean="0"/>
-              <a:t>2/16/23</a:t>
+              <a:t>2/20/23</a:t>
             </a:fld>
             <a:endParaRPr lang="en-US"/>
           </a:p>
@@ -17872,6 +17876,430 @@
       </p:grpSpPr>
       <p:sp>
         <p:nvSpPr>
+          <p:cNvPr id="2" name="Titre 1">
+            <a:extLst>
+              <a:ext uri="{FF2B5EF4-FFF2-40B4-BE49-F238E27FC236}">
+                <a16:creationId xmlns:a16="http://schemas.microsoft.com/office/drawing/2014/main" id="{1FCD3F2E-2DCA-876A-27F6-E042DDC57529}"/>
+              </a:ext>
+            </a:extLst>
+          </p:cNvPr>
+          <p:cNvSpPr>
+            <a:spLocks noGrp="1"/>
+          </p:cNvSpPr>
+          <p:nvPr>
+            <p:ph type="title"/>
+          </p:nvPr>
+        </p:nvSpPr>
+        <p:spPr/>
+        <p:txBody>
+          <a:bodyPr/>
+          <a:lstStyle/>
+          <a:p>
+            <a:r>
+              <a:rPr lang="fr-CA" dirty="0"/>
+              <a:t>R est un langage orienté « objet »</a:t>
+            </a:r>
+          </a:p>
+        </p:txBody>
+      </p:sp>
+      <p:sp>
+        <p:nvSpPr>
+          <p:cNvPr id="4" name="Espace réservé du texte 3">
+            <a:extLst>
+              <a:ext uri="{FF2B5EF4-FFF2-40B4-BE49-F238E27FC236}">
+                <a16:creationId xmlns:a16="http://schemas.microsoft.com/office/drawing/2014/main" id="{F72DF280-549A-042E-5C48-AE7F3FD8F967}"/>
+              </a:ext>
+            </a:extLst>
+          </p:cNvPr>
+          <p:cNvSpPr>
+            <a:spLocks noGrp="1"/>
+          </p:cNvSpPr>
+          <p:nvPr>
+            <p:ph type="body" idx="1"/>
+          </p:nvPr>
+        </p:nvSpPr>
+        <p:spPr/>
+        <p:txBody>
+          <a:bodyPr/>
+          <a:lstStyle/>
+          <a:p>
+            <a:r>
+              <a:rPr lang="fr-CA" dirty="0"/>
+              <a:t>Définition</a:t>
+            </a:r>
+          </a:p>
+        </p:txBody>
+      </p:sp>
+      <p:sp>
+        <p:nvSpPr>
+          <p:cNvPr id="3" name="Espace réservé du contenu 2">
+            <a:extLst>
+              <a:ext uri="{FF2B5EF4-FFF2-40B4-BE49-F238E27FC236}">
+                <a16:creationId xmlns:a16="http://schemas.microsoft.com/office/drawing/2014/main" id="{43E2E83E-DBAF-4D2B-93B0-AC3561025278}"/>
+              </a:ext>
+            </a:extLst>
+          </p:cNvPr>
+          <p:cNvSpPr>
+            <a:spLocks noGrp="1"/>
+          </p:cNvSpPr>
+          <p:nvPr>
+            <p:ph sz="half" idx="2"/>
+          </p:nvPr>
+        </p:nvSpPr>
+        <p:spPr>
+          <a:xfrm>
+            <a:off x="1115568" y="3203688"/>
+            <a:ext cx="4937760" cy="3404930"/>
+          </a:xfrm>
+        </p:spPr>
+        <p:txBody>
+          <a:bodyPr>
+            <a:normAutofit fontScale="85000" lnSpcReduction="20000"/>
+          </a:bodyPr>
+          <a:lstStyle/>
+          <a:p>
+            <a:r>
+              <a:rPr lang="fr-CA" dirty="0"/>
+              <a:t>À peu près tout dans R est un objet. Qu’est-ce que cela veut dire?</a:t>
+            </a:r>
+          </a:p>
+          <a:p>
+            <a:pPr lvl="1"/>
+            <a:r>
+              <a:rPr lang="fr-CA" i="1" dirty="0"/>
+              <a:t>Object </a:t>
+            </a:r>
+            <a:r>
+              <a:rPr lang="fr-CA" i="1" dirty="0" err="1"/>
+              <a:t>Oriented</a:t>
+            </a:r>
+            <a:r>
+              <a:rPr lang="fr-CA" i="1" dirty="0"/>
+              <a:t> </a:t>
+            </a:r>
+            <a:r>
+              <a:rPr lang="fr-CA" i="1" dirty="0" err="1"/>
+              <a:t>Language</a:t>
+            </a:r>
+            <a:r>
+              <a:rPr lang="fr-CA" dirty="0"/>
+              <a:t> est un paradigme de programmation qui mise sur la modélisation des données sous forme d’objet.</a:t>
+            </a:r>
+          </a:p>
+          <a:p>
+            <a:pPr lvl="1"/>
+            <a:r>
+              <a:rPr lang="fr-CA" dirty="0"/>
+              <a:t>Des objets sont des instances autonomes pourvus d’attributs et de méthodes.</a:t>
+            </a:r>
+          </a:p>
+          <a:p>
+            <a:pPr lvl="1"/>
+            <a:r>
+              <a:rPr lang="fr-CA" dirty="0"/>
+              <a:t>Dans un OOL, les données sont encapsulées dans des objets, dont on peut vérifier les attributs.</a:t>
+            </a:r>
+          </a:p>
+          <a:p>
+            <a:pPr lvl="1"/>
+            <a:endParaRPr lang="fr-CA" dirty="0"/>
+          </a:p>
+        </p:txBody>
+      </p:sp>
+      <p:sp>
+        <p:nvSpPr>
+          <p:cNvPr id="5" name="Espace réservé du texte 4">
+            <a:extLst>
+              <a:ext uri="{FF2B5EF4-FFF2-40B4-BE49-F238E27FC236}">
+                <a16:creationId xmlns:a16="http://schemas.microsoft.com/office/drawing/2014/main" id="{FEDD7881-2E1F-FD2A-F79B-02904AC01808}"/>
+              </a:ext>
+            </a:extLst>
+          </p:cNvPr>
+          <p:cNvSpPr>
+            <a:spLocks noGrp="1"/>
+          </p:cNvSpPr>
+          <p:nvPr>
+            <p:ph type="body" sz="quarter" idx="3"/>
+          </p:nvPr>
+        </p:nvSpPr>
+        <p:spPr/>
+        <p:txBody>
+          <a:bodyPr/>
+          <a:lstStyle/>
+          <a:p>
+            <a:r>
+              <a:rPr lang="fr-CA" dirty="0"/>
+              <a:t>Exemple</a:t>
+            </a:r>
+          </a:p>
+        </p:txBody>
+      </p:sp>
+      <p:sp>
+        <p:nvSpPr>
+          <p:cNvPr id="6" name="Espace réservé du contenu 5">
+            <a:extLst>
+              <a:ext uri="{FF2B5EF4-FFF2-40B4-BE49-F238E27FC236}">
+                <a16:creationId xmlns:a16="http://schemas.microsoft.com/office/drawing/2014/main" id="{FA1E2320-981A-CA0A-F83D-5E1B0D034935}"/>
+              </a:ext>
+            </a:extLst>
+          </p:cNvPr>
+          <p:cNvSpPr>
+            <a:spLocks noGrp="1"/>
+          </p:cNvSpPr>
+          <p:nvPr>
+            <p:ph sz="quarter" idx="4"/>
+          </p:nvPr>
+        </p:nvSpPr>
+        <p:spPr>
+          <a:xfrm>
+            <a:off x="6345936" y="3203687"/>
+            <a:ext cx="4937760" cy="3404930"/>
+          </a:xfrm>
+        </p:spPr>
+        <p:txBody>
+          <a:bodyPr>
+            <a:normAutofit fontScale="85000" lnSpcReduction="20000"/>
+          </a:bodyPr>
+          <a:lstStyle/>
+          <a:p>
+            <a:r>
+              <a:rPr lang="fr-CA" dirty="0"/>
+              <a:t>Le jeu de données que nous allons importer dans R a les attributs suivants:</a:t>
+            </a:r>
+          </a:p>
+          <a:p>
+            <a:pPr marL="457200" lvl="1" indent="0">
+              <a:buNone/>
+            </a:pPr>
+            <a:endParaRPr lang="fr-CA" dirty="0"/>
+          </a:p>
+          <a:p>
+            <a:pPr marL="457200" lvl="1" indent="0">
+              <a:buNone/>
+            </a:pPr>
+            <a:r>
+              <a:rPr lang="fr-CA" dirty="0"/>
+              <a:t>&gt; </a:t>
+            </a:r>
+            <a:r>
+              <a:rPr lang="fr-CA" dirty="0" err="1">
+                <a:highlight>
+                  <a:srgbClr val="FF00FF"/>
+                </a:highlight>
+              </a:rPr>
+              <a:t>attributes</a:t>
+            </a:r>
+            <a:r>
+              <a:rPr lang="fr-CA" dirty="0">
+                <a:highlight>
+                  <a:srgbClr val="FF00FF"/>
+                </a:highlight>
+              </a:rPr>
+              <a:t>(</a:t>
+            </a:r>
+            <a:r>
+              <a:rPr lang="fr-CA" dirty="0" err="1">
+                <a:highlight>
+                  <a:srgbClr val="FF00FF"/>
+                </a:highlight>
+              </a:rPr>
+              <a:t>xyz</a:t>
+            </a:r>
+            <a:r>
+              <a:rPr lang="fr-CA" dirty="0">
+                <a:highlight>
+                  <a:srgbClr val="FF00FF"/>
+                </a:highlight>
+              </a:rPr>
+              <a:t>)</a:t>
+            </a:r>
+          </a:p>
+          <a:p>
+            <a:pPr marL="457200" lvl="1" indent="0">
+              <a:spcBef>
+                <a:spcPts val="0"/>
+              </a:spcBef>
+              <a:buNone/>
+            </a:pPr>
+            <a:r>
+              <a:rPr lang="fr-CA" dirty="0">
+                <a:highlight>
+                  <a:srgbClr val="FFFF00"/>
+                </a:highlight>
+              </a:rPr>
+              <a:t>$</a:t>
+            </a:r>
+            <a:r>
+              <a:rPr lang="fr-CA" dirty="0" err="1">
+                <a:highlight>
+                  <a:srgbClr val="FFFF00"/>
+                </a:highlight>
+              </a:rPr>
+              <a:t>names</a:t>
+            </a:r>
+            <a:endParaRPr lang="fr-CA" dirty="0">
+              <a:highlight>
+                <a:srgbClr val="FFFF00"/>
+              </a:highlight>
+            </a:endParaRPr>
+          </a:p>
+          <a:p>
+            <a:pPr marL="457200" lvl="1" indent="0">
+              <a:spcBef>
+                <a:spcPts val="0"/>
+              </a:spcBef>
+              <a:buNone/>
+            </a:pPr>
+            <a:r>
+              <a:rPr lang="fr-CA" dirty="0"/>
+              <a:t> [1] "périodique"       "titre" …</a:t>
+            </a:r>
+          </a:p>
+          <a:p>
+            <a:pPr marL="457200" lvl="1" indent="0">
+              <a:spcBef>
+                <a:spcPts val="0"/>
+              </a:spcBef>
+              <a:buNone/>
+            </a:pPr>
+            <a:endParaRPr lang="fr-CA" dirty="0"/>
+          </a:p>
+          <a:p>
+            <a:pPr marL="457200" lvl="1" indent="0">
+              <a:spcBef>
+                <a:spcPts val="0"/>
+              </a:spcBef>
+              <a:buNone/>
+            </a:pPr>
+            <a:r>
+              <a:rPr lang="fr-CA" dirty="0">
+                <a:highlight>
+                  <a:srgbClr val="FFFF00"/>
+                </a:highlight>
+              </a:rPr>
+              <a:t>$</a:t>
+            </a:r>
+            <a:r>
+              <a:rPr lang="fr-CA" dirty="0" err="1">
+                <a:highlight>
+                  <a:srgbClr val="FFFF00"/>
+                </a:highlight>
+              </a:rPr>
+              <a:t>row.names</a:t>
+            </a:r>
+            <a:endParaRPr lang="fr-CA" dirty="0">
+              <a:highlight>
+                <a:srgbClr val="FFFF00"/>
+              </a:highlight>
+            </a:endParaRPr>
+          </a:p>
+          <a:p>
+            <a:pPr marL="457200" lvl="1" indent="0">
+              <a:spcBef>
+                <a:spcPts val="0"/>
+              </a:spcBef>
+              <a:buNone/>
+            </a:pPr>
+            <a:r>
+              <a:rPr lang="fr-CA" dirty="0"/>
+              <a:t>[1] 1 2 3 4 5</a:t>
+            </a:r>
+          </a:p>
+          <a:p>
+            <a:pPr marL="457200" lvl="1" indent="0">
+              <a:spcBef>
+                <a:spcPts val="0"/>
+              </a:spcBef>
+              <a:buNone/>
+            </a:pPr>
+            <a:endParaRPr lang="fr-CA" dirty="0"/>
+          </a:p>
+          <a:p>
+            <a:pPr marL="457200" lvl="1" indent="0">
+              <a:spcBef>
+                <a:spcPts val="0"/>
+              </a:spcBef>
+              <a:buNone/>
+            </a:pPr>
+            <a:r>
+              <a:rPr lang="fr-CA" dirty="0">
+                <a:highlight>
+                  <a:srgbClr val="FFFF00"/>
+                </a:highlight>
+              </a:rPr>
+              <a:t>$class</a:t>
+            </a:r>
+          </a:p>
+          <a:p>
+            <a:pPr marL="457200" lvl="1" indent="0">
+              <a:spcBef>
+                <a:spcPts val="0"/>
+              </a:spcBef>
+              <a:buNone/>
+            </a:pPr>
+            <a:r>
+              <a:rPr lang="fr-CA" dirty="0"/>
+              <a:t>[1] "</a:t>
+            </a:r>
+            <a:r>
+              <a:rPr lang="fr-CA" dirty="0" err="1"/>
+              <a:t>tbl_df</a:t>
+            </a:r>
+            <a:r>
+              <a:rPr lang="fr-CA" dirty="0"/>
+              <a:t>"     "</a:t>
+            </a:r>
+            <a:r>
+              <a:rPr lang="fr-CA" dirty="0" err="1"/>
+              <a:t>tbl</a:t>
+            </a:r>
+            <a:r>
+              <a:rPr lang="fr-CA" dirty="0"/>
+              <a:t>"        "</a:t>
+            </a:r>
+            <a:r>
+              <a:rPr lang="fr-CA" dirty="0" err="1"/>
+              <a:t>data.frame</a:t>
+            </a:r>
+            <a:r>
+              <a:rPr lang="fr-CA" dirty="0"/>
+              <a:t>"</a:t>
+            </a:r>
+          </a:p>
+        </p:txBody>
+      </p:sp>
+    </p:spTree>
+    <p:extLst>
+      <p:ext uri="{BB962C8B-B14F-4D97-AF65-F5344CB8AC3E}">
+        <p14:creationId xmlns:p14="http://schemas.microsoft.com/office/powerpoint/2010/main" val="1201350102"/>
+      </p:ext>
+    </p:extLst>
+  </p:cSld>
+  <p:clrMapOvr>
+    <a:masterClrMapping/>
+  </p:clrMapOvr>
+</p:sld>
+</file>
+
+<file path=ppt/slides/slide12.xml><?xml version="1.0" encoding="utf-8"?>
+<p:sld xmlns:a="http://schemas.openxmlformats.org/drawingml/2006/main" xmlns:r="http://schemas.openxmlformats.org/officeDocument/2006/relationships" xmlns:p="http://schemas.openxmlformats.org/presentationml/2006/main">
+  <p:cSld>
+    <p:spTree>
+      <p:nvGrpSpPr>
+        <p:cNvPr id="1" name=""/>
+        <p:cNvGrpSpPr/>
+        <p:nvPr/>
+      </p:nvGrpSpPr>
+      <p:grpSpPr>
+        <a:xfrm>
+          <a:off x="0" y="0"/>
+          <a:ext cx="0" cy="0"/>
+          <a:chOff x="0" y="0"/>
+          <a:chExt cx="0" cy="0"/>
+        </a:xfrm>
+      </p:grpSpPr>
+      <p:sp>
+        <p:nvSpPr>
           <p:cNvPr id="3" name="Titre 2">
             <a:extLst>
               <a:ext uri="{FF2B5EF4-FFF2-40B4-BE49-F238E27FC236}">
@@ -18678,7 +19106,7 @@
 </p:sld>
 </file>
 
-<file path=ppt/slides/slide12.xml><?xml version="1.0" encoding="utf-8"?>
+<file path=ppt/slides/slide13.xml><?xml version="1.0" encoding="utf-8"?>
 <p:sld xmlns:a="http://schemas.openxmlformats.org/drawingml/2006/main" xmlns:r="http://schemas.openxmlformats.org/officeDocument/2006/relationships" xmlns:p="http://schemas.openxmlformats.org/presentationml/2006/main">
   <p:cSld>
     <p:spTree>
@@ -19124,7 +19552,7 @@
 </p:sld>
 </file>
 
-<file path=ppt/slides/slide13.xml><?xml version="1.0" encoding="utf-8"?>
+<file path=ppt/slides/slide14.xml><?xml version="1.0" encoding="utf-8"?>
 <p:sld xmlns:a="http://schemas.openxmlformats.org/drawingml/2006/main" xmlns:r="http://schemas.openxmlformats.org/officeDocument/2006/relationships" xmlns:p="http://schemas.openxmlformats.org/presentationml/2006/main">
   <p:cSld>
     <p:bg>
@@ -20322,7 +20750,7 @@
 </p:sld>
 </file>
 
-<file path=ppt/slides/slide14.xml><?xml version="1.0" encoding="utf-8"?>
+<file path=ppt/slides/slide15.xml><?xml version="1.0" encoding="utf-8"?>
 <p:sld xmlns:a="http://schemas.openxmlformats.org/drawingml/2006/main" xmlns:r="http://schemas.openxmlformats.org/officeDocument/2006/relationships" xmlns:p="http://schemas.openxmlformats.org/presentationml/2006/main">
   <p:cSld>
     <p:spTree>
@@ -20986,7 +21414,7 @@
 </p:sld>
 </file>
 
-<file path=ppt/slides/slide15.xml><?xml version="1.0" encoding="utf-8"?>
+<file path=ppt/slides/slide16.xml><?xml version="1.0" encoding="utf-8"?>
 <p:sld xmlns:a="http://schemas.openxmlformats.org/drawingml/2006/main" xmlns:r="http://schemas.openxmlformats.org/officeDocument/2006/relationships" xmlns:p="http://schemas.openxmlformats.org/presentationml/2006/main">
   <p:cSld>
     <p:spTree>
@@ -21905,7 +22333,7 @@
 </p:sld>
 </file>
 
-<file path=ppt/slides/slide16.xml><?xml version="1.0" encoding="utf-8"?>
+<file path=ppt/slides/slide17.xml><?xml version="1.0" encoding="utf-8"?>
 <p:sld xmlns:a="http://schemas.openxmlformats.org/drawingml/2006/main" xmlns:r="http://schemas.openxmlformats.org/officeDocument/2006/relationships" xmlns:p="http://schemas.openxmlformats.org/presentationml/2006/main">
   <p:cSld>
     <p:spTree>
@@ -22722,7 +23150,7 @@
 </p:sld>
 </file>
 
-<file path=ppt/slides/slide17.xml><?xml version="1.0" encoding="utf-8"?>
+<file path=ppt/slides/slide18.xml><?xml version="1.0" encoding="utf-8"?>
 <p:sld xmlns:a="http://schemas.openxmlformats.org/drawingml/2006/main" xmlns:r="http://schemas.openxmlformats.org/officeDocument/2006/relationships" xmlns:p="http://schemas.openxmlformats.org/presentationml/2006/main">
   <p:cSld>
     <p:spTree>
@@ -23392,7 +23820,7 @@
 </p:sld>
 </file>
 
-<file path=ppt/slides/slide18.xml><?xml version="1.0" encoding="utf-8"?>
+<file path=ppt/slides/slide19.xml><?xml version="1.0" encoding="utf-8"?>
 <p:sld xmlns:a="http://schemas.openxmlformats.org/drawingml/2006/main" xmlns:r="http://schemas.openxmlformats.org/officeDocument/2006/relationships" xmlns:p="http://schemas.openxmlformats.org/presentationml/2006/main">
   <p:cSld>
     <p:spTree>
@@ -24221,453 +24649,6 @@
 </p:sld>
 </file>
 
-<file path=ppt/slides/slide19.xml><?xml version="1.0" encoding="utf-8"?>
-<p:sld xmlns:a="http://schemas.openxmlformats.org/drawingml/2006/main" xmlns:r="http://schemas.openxmlformats.org/officeDocument/2006/relationships" xmlns:p="http://schemas.openxmlformats.org/presentationml/2006/main">
-  <p:cSld>
-    <p:spTree>
-      <p:nvGrpSpPr>
-        <p:cNvPr id="1" name=""/>
-        <p:cNvGrpSpPr/>
-        <p:nvPr/>
-      </p:nvGrpSpPr>
-      <p:grpSpPr>
-        <a:xfrm>
-          <a:off x="0" y="0"/>
-          <a:ext cx="0" cy="0"/>
-          <a:chOff x="0" y="0"/>
-          <a:chExt cx="0" cy="0"/>
-        </a:xfrm>
-      </p:grpSpPr>
-      <p:sp>
-        <p:nvSpPr>
-          <p:cNvPr id="2" name="Titre 1">
-            <a:extLst>
-              <a:ext uri="{FF2B5EF4-FFF2-40B4-BE49-F238E27FC236}">
-                <a16:creationId xmlns:a16="http://schemas.microsoft.com/office/drawing/2014/main" id="{64BE12C7-1932-7824-F6D2-D0275FFDA57F}"/>
-              </a:ext>
-            </a:extLst>
-          </p:cNvPr>
-          <p:cNvSpPr>
-            <a:spLocks noGrp="1"/>
-          </p:cNvSpPr>
-          <p:nvPr>
-            <p:ph type="title"/>
-          </p:nvPr>
-        </p:nvSpPr>
-        <p:spPr/>
-        <p:txBody>
-          <a:bodyPr/>
-          <a:lstStyle/>
-          <a:p>
-            <a:r>
-              <a:rPr lang="fr-CA" dirty="0"/>
-              <a:t>Opérateur d’assignation</a:t>
-            </a:r>
-          </a:p>
-        </p:txBody>
-      </p:sp>
-      <p:sp>
-        <p:nvSpPr>
-          <p:cNvPr id="5" name="Espace réservé du contenu 4">
-            <a:extLst>
-              <a:ext uri="{FF2B5EF4-FFF2-40B4-BE49-F238E27FC236}">
-                <a16:creationId xmlns:a16="http://schemas.microsoft.com/office/drawing/2014/main" id="{435D4A56-727A-932D-9B3C-6EFD41C8271F}"/>
-              </a:ext>
-            </a:extLst>
-          </p:cNvPr>
-          <p:cNvSpPr>
-            <a:spLocks noGrp="1"/>
-          </p:cNvSpPr>
-          <p:nvPr>
-            <p:ph idx="1"/>
-          </p:nvPr>
-        </p:nvSpPr>
-        <p:spPr>
-          <a:xfrm>
-            <a:off x="1115568" y="2038865"/>
-            <a:ext cx="10168128" cy="4133335"/>
-          </a:xfrm>
-        </p:spPr>
-        <p:txBody>
-          <a:bodyPr>
-            <a:normAutofit/>
-          </a:bodyPr>
-          <a:lstStyle/>
-          <a:p>
-            <a:r>
-              <a:rPr lang="fr-CA" dirty="0"/>
-              <a:t>L’opérateur d’assignation dans R est une flèche! Elle indique que le résultat de ce qui est produit à sa droite doit être emmagasiné dans un conteneur, une variable dont le nom figure à sa gauche.</a:t>
-            </a:r>
-          </a:p>
-          <a:p>
-            <a:r>
-              <a:rPr lang="fr-CA" dirty="0"/>
-              <a:t>Exemple:</a:t>
-            </a:r>
-          </a:p>
-          <a:p>
-            <a:pPr marL="0" indent="0">
-              <a:buNone/>
-            </a:pPr>
-            <a:endParaRPr lang="fr-CA" sz="1800" dirty="0">
-              <a:latin typeface="American Typewriter" panose="02090604020004020304" pitchFamily="18" charset="77"/>
-              <a:cs typeface="Arial" panose="020B0604020202020204" pitchFamily="34" charset="0"/>
-            </a:endParaRPr>
-          </a:p>
-          <a:p>
-            <a:pPr marL="0" indent="0">
-              <a:buNone/>
-            </a:pPr>
-            <a:r>
-              <a:rPr lang="fr-CA" dirty="0" err="1">
-                <a:latin typeface="American Typewriter" panose="02090604020004020304" pitchFamily="18" charset="77"/>
-                <a:cs typeface="Arial" panose="020B0604020202020204" pitchFamily="34" charset="0"/>
-              </a:rPr>
-              <a:t>premier_texte_xyz</a:t>
-            </a:r>
-            <a:r>
-              <a:rPr lang="fr-CA" dirty="0">
-                <a:latin typeface="American Typewriter" panose="02090604020004020304" pitchFamily="18" charset="77"/>
-                <a:cs typeface="Arial" panose="020B0604020202020204" pitchFamily="34" charset="0"/>
-              </a:rPr>
-              <a:t>        </a:t>
-            </a:r>
-            <a:r>
-              <a:rPr lang="fr-CA" b="1" dirty="0">
-                <a:highlight>
-                  <a:srgbClr val="FFFF00"/>
-                </a:highlight>
-                <a:latin typeface="American Typewriter" panose="02090604020004020304" pitchFamily="18" charset="77"/>
-                <a:cs typeface="Arial" panose="020B0604020202020204" pitchFamily="34" charset="0"/>
-              </a:rPr>
-              <a:t>&lt;-</a:t>
-            </a:r>
-            <a:r>
-              <a:rPr lang="fr-CA" dirty="0">
-                <a:latin typeface="American Typewriter" panose="02090604020004020304" pitchFamily="18" charset="77"/>
-                <a:cs typeface="Arial" panose="020B0604020202020204" pitchFamily="34" charset="0"/>
-              </a:rPr>
-              <a:t>       </a:t>
-            </a:r>
-            <a:r>
-              <a:rPr lang="fr-CA" dirty="0" err="1">
-                <a:latin typeface="American Typewriter" panose="02090604020004020304" pitchFamily="18" charset="77"/>
-                <a:cs typeface="Arial" panose="020B0604020202020204" pitchFamily="34" charset="0"/>
-              </a:rPr>
-              <a:t>corpus_xyz</a:t>
-            </a:r>
-            <a:r>
-              <a:rPr lang="fr-CA" dirty="0">
-                <a:latin typeface="American Typewriter" panose="02090604020004020304" pitchFamily="18" charset="77"/>
-                <a:cs typeface="Arial" panose="020B0604020202020204" pitchFamily="34" charset="0"/>
-              </a:rPr>
-              <a:t>[ 1, "</a:t>
-            </a:r>
-            <a:r>
-              <a:rPr lang="fr-CA" dirty="0" err="1">
-                <a:latin typeface="American Typewriter" panose="02090604020004020304" pitchFamily="18" charset="77"/>
-                <a:cs typeface="Arial" panose="020B0604020202020204" pitchFamily="34" charset="0"/>
-              </a:rPr>
-              <a:t>t</a:t>
-            </a:r>
-            <a:r>
-              <a:rPr lang="fr-CA" noProof="1">
-                <a:latin typeface="American Typewriter" panose="02090604020004020304" pitchFamily="18" charset="77"/>
-                <a:cs typeface="Arial" panose="020B0604020202020204" pitchFamily="34" charset="0"/>
-              </a:rPr>
-              <a:t>exte" ]</a:t>
-            </a:r>
-          </a:p>
-        </p:txBody>
-      </p:sp>
-      <p:sp>
-        <p:nvSpPr>
-          <p:cNvPr id="7" name="Flèche vers le haut 6">
-            <a:extLst>
-              <a:ext uri="{FF2B5EF4-FFF2-40B4-BE49-F238E27FC236}">
-                <a16:creationId xmlns:a16="http://schemas.microsoft.com/office/drawing/2014/main" id="{BAA04B77-8F40-8B51-B8ED-9C36BFCB8E53}"/>
-              </a:ext>
-            </a:extLst>
-          </p:cNvPr>
-          <p:cNvSpPr/>
-          <p:nvPr/>
-        </p:nvSpPr>
-        <p:spPr>
-          <a:xfrm>
-            <a:off x="2240095" y="5026350"/>
-            <a:ext cx="333633" cy="358346"/>
-          </a:xfrm>
-          <a:prstGeom prst="upArrow">
-            <a:avLst/>
-          </a:prstGeom>
-          <a:solidFill>
-            <a:schemeClr val="tx2"/>
-          </a:solidFill>
-          <a:ln>
-            <a:solidFill>
-              <a:schemeClr val="tx1"/>
-            </a:solidFill>
-          </a:ln>
-        </p:spPr>
-        <p:style>
-          <a:lnRef idx="2">
-            <a:schemeClr val="accent1">
-              <a:shade val="50000"/>
-            </a:schemeClr>
-          </a:lnRef>
-          <a:fillRef idx="1">
-            <a:schemeClr val="accent1"/>
-          </a:fillRef>
-          <a:effectRef idx="0">
-            <a:schemeClr val="accent1"/>
-          </a:effectRef>
-          <a:fontRef idx="minor">
-            <a:schemeClr val="lt1"/>
-          </a:fontRef>
-        </p:style>
-        <p:txBody>
-          <a:bodyPr rtlCol="0" anchor="ctr"/>
-          <a:lstStyle/>
-          <a:p>
-            <a:pPr algn="ctr"/>
-            <a:endParaRPr lang="fr-CA"/>
-          </a:p>
-        </p:txBody>
-      </p:sp>
-      <p:sp>
-        <p:nvSpPr>
-          <p:cNvPr id="8" name="Flèche vers le haut 7">
-            <a:extLst>
-              <a:ext uri="{FF2B5EF4-FFF2-40B4-BE49-F238E27FC236}">
-                <a16:creationId xmlns:a16="http://schemas.microsoft.com/office/drawing/2014/main" id="{ADB4A2B9-974A-7B29-A8F0-D4F32CDC9F53}"/>
-              </a:ext>
-            </a:extLst>
-          </p:cNvPr>
-          <p:cNvSpPr/>
-          <p:nvPr/>
-        </p:nvSpPr>
-        <p:spPr>
-          <a:xfrm>
-            <a:off x="4565521" y="5026350"/>
-            <a:ext cx="333633" cy="358346"/>
-          </a:xfrm>
-          <a:prstGeom prst="upArrow">
-            <a:avLst/>
-          </a:prstGeom>
-          <a:solidFill>
-            <a:schemeClr val="tx1"/>
-          </a:solidFill>
-        </p:spPr>
-        <p:style>
-          <a:lnRef idx="2">
-            <a:schemeClr val="accent1">
-              <a:shade val="50000"/>
-            </a:schemeClr>
-          </a:lnRef>
-          <a:fillRef idx="1">
-            <a:schemeClr val="accent1"/>
-          </a:fillRef>
-          <a:effectRef idx="0">
-            <a:schemeClr val="accent1"/>
-          </a:effectRef>
-          <a:fontRef idx="minor">
-            <a:schemeClr val="lt1"/>
-          </a:fontRef>
-        </p:style>
-        <p:txBody>
-          <a:bodyPr rtlCol="0" anchor="ctr"/>
-          <a:lstStyle/>
-          <a:p>
-            <a:pPr algn="ctr"/>
-            <a:endParaRPr lang="fr-CA"/>
-          </a:p>
-        </p:txBody>
-      </p:sp>
-      <p:sp>
-        <p:nvSpPr>
-          <p:cNvPr id="9" name="Flèche vers le haut 8">
-            <a:extLst>
-              <a:ext uri="{FF2B5EF4-FFF2-40B4-BE49-F238E27FC236}">
-                <a16:creationId xmlns:a16="http://schemas.microsoft.com/office/drawing/2014/main" id="{2A6EE37C-8199-1125-D73A-A94674012EE8}"/>
-              </a:ext>
-            </a:extLst>
-          </p:cNvPr>
-          <p:cNvSpPr/>
-          <p:nvPr/>
-        </p:nvSpPr>
-        <p:spPr>
-          <a:xfrm>
-            <a:off x="6818767" y="5026350"/>
-            <a:ext cx="333633" cy="358346"/>
-          </a:xfrm>
-          <a:prstGeom prst="upArrow">
-            <a:avLst/>
-          </a:prstGeom>
-          <a:solidFill>
-            <a:schemeClr val="tx1"/>
-          </a:solidFill>
-        </p:spPr>
-        <p:style>
-          <a:lnRef idx="2">
-            <a:schemeClr val="accent1">
-              <a:shade val="50000"/>
-            </a:schemeClr>
-          </a:lnRef>
-          <a:fillRef idx="1">
-            <a:schemeClr val="accent1"/>
-          </a:fillRef>
-          <a:effectRef idx="0">
-            <a:schemeClr val="accent1"/>
-          </a:effectRef>
-          <a:fontRef idx="minor">
-            <a:schemeClr val="lt1"/>
-          </a:fontRef>
-        </p:style>
-        <p:txBody>
-          <a:bodyPr rtlCol="0" anchor="ctr"/>
-          <a:lstStyle/>
-          <a:p>
-            <a:pPr algn="ctr"/>
-            <a:endParaRPr lang="fr-CA"/>
-          </a:p>
-        </p:txBody>
-      </p:sp>
-      <p:sp>
-        <p:nvSpPr>
-          <p:cNvPr id="10" name="ZoneTexte 9">
-            <a:extLst>
-              <a:ext uri="{FF2B5EF4-FFF2-40B4-BE49-F238E27FC236}">
-                <a16:creationId xmlns:a16="http://schemas.microsoft.com/office/drawing/2014/main" id="{7BC67604-5749-5BC4-B3C6-56D447B50DCB}"/>
-              </a:ext>
-            </a:extLst>
-          </p:cNvPr>
-          <p:cNvSpPr txBox="1"/>
-          <p:nvPr/>
-        </p:nvSpPr>
-        <p:spPr>
-          <a:xfrm>
-            <a:off x="1878896" y="5552062"/>
-            <a:ext cx="1056029" cy="307777"/>
-          </a:xfrm>
-          <a:prstGeom prst="rect">
-            <a:avLst/>
-          </a:prstGeom>
-          <a:solidFill>
-            <a:schemeClr val="accent6">
-              <a:alpha val="28942"/>
-            </a:schemeClr>
-          </a:solidFill>
-        </p:spPr>
-        <p:txBody>
-          <a:bodyPr wrap="square" rtlCol="0">
-            <a:spAutoFit/>
-          </a:bodyPr>
-          <a:lstStyle/>
-          <a:p>
-            <a:r>
-              <a:rPr lang="fr-CA" sz="1400" dirty="0">
-                <a:latin typeface="Monaco" pitchFamily="2" charset="77"/>
-              </a:rPr>
-              <a:t>variable</a:t>
-            </a:r>
-          </a:p>
-        </p:txBody>
-      </p:sp>
-      <p:sp>
-        <p:nvSpPr>
-          <p:cNvPr id="11" name="ZoneTexte 10">
-            <a:extLst>
-              <a:ext uri="{FF2B5EF4-FFF2-40B4-BE49-F238E27FC236}">
-                <a16:creationId xmlns:a16="http://schemas.microsoft.com/office/drawing/2014/main" id="{6CC4A089-A466-62F3-CC1E-B352B2F65CC3}"/>
-              </a:ext>
-            </a:extLst>
-          </p:cNvPr>
-          <p:cNvSpPr txBox="1"/>
-          <p:nvPr/>
-        </p:nvSpPr>
-        <p:spPr>
-          <a:xfrm>
-            <a:off x="3937200" y="5516838"/>
-            <a:ext cx="1590274" cy="523220"/>
-          </a:xfrm>
-          <a:prstGeom prst="rect">
-            <a:avLst/>
-          </a:prstGeom>
-          <a:solidFill>
-            <a:schemeClr val="accent6">
-              <a:alpha val="28942"/>
-            </a:schemeClr>
-          </a:solidFill>
-        </p:spPr>
-        <p:txBody>
-          <a:bodyPr wrap="square" rtlCol="0">
-            <a:spAutoFit/>
-          </a:bodyPr>
-          <a:lstStyle/>
-          <a:p>
-            <a:r>
-              <a:rPr lang="fr-CA" sz="1400" dirty="0">
-                <a:latin typeface="Monaco" pitchFamily="2" charset="77"/>
-              </a:rPr>
-              <a:t>Opérateur d’assignation</a:t>
-            </a:r>
-          </a:p>
-        </p:txBody>
-      </p:sp>
-      <p:sp>
-        <p:nvSpPr>
-          <p:cNvPr id="12" name="ZoneTexte 11">
-            <a:extLst>
-              <a:ext uri="{FF2B5EF4-FFF2-40B4-BE49-F238E27FC236}">
-                <a16:creationId xmlns:a16="http://schemas.microsoft.com/office/drawing/2014/main" id="{22F132EC-42F6-0782-5797-3F1E3CFE4EBB}"/>
-              </a:ext>
-            </a:extLst>
-          </p:cNvPr>
-          <p:cNvSpPr txBox="1"/>
-          <p:nvPr/>
-        </p:nvSpPr>
-        <p:spPr>
-          <a:xfrm>
-            <a:off x="6312002" y="5546125"/>
-            <a:ext cx="1380563" cy="307777"/>
-          </a:xfrm>
-          <a:prstGeom prst="rect">
-            <a:avLst/>
-          </a:prstGeom>
-          <a:solidFill>
-            <a:schemeClr val="accent6">
-              <a:alpha val="28942"/>
-            </a:schemeClr>
-          </a:solidFill>
-        </p:spPr>
-        <p:txBody>
-          <a:bodyPr wrap="square" rtlCol="0">
-            <a:spAutoFit/>
-          </a:bodyPr>
-          <a:lstStyle/>
-          <a:p>
-            <a:r>
-              <a:rPr lang="fr-CA" sz="1400" dirty="0">
-                <a:latin typeface="Monaco" pitchFamily="2" charset="77"/>
-              </a:rPr>
-              <a:t>instruction</a:t>
-            </a:r>
-          </a:p>
-        </p:txBody>
-      </p:sp>
-    </p:spTree>
-    <p:extLst>
-      <p:ext uri="{BB962C8B-B14F-4D97-AF65-F5344CB8AC3E}">
-        <p14:creationId xmlns:p14="http://schemas.microsoft.com/office/powerpoint/2010/main" val="2411237706"/>
-      </p:ext>
-    </p:extLst>
-  </p:cSld>
-  <p:clrMapOvr>
-    <a:masterClrMapping/>
-  </p:clrMapOvr>
-</p:sld>
-</file>
-
 <file path=ppt/slides/slide2.xml><?xml version="1.0" encoding="utf-8"?>
 <p:sld xmlns:a="http://schemas.openxmlformats.org/drawingml/2006/main" xmlns:r="http://schemas.openxmlformats.org/officeDocument/2006/relationships" xmlns:p="http://schemas.openxmlformats.org/presentationml/2006/main">
   <p:cSld>
@@ -25164,6 +25145,453 @@
         </p:nvSpPr>
         <p:spPr/>
         <p:txBody>
+          <a:bodyPr/>
+          <a:lstStyle/>
+          <a:p>
+            <a:r>
+              <a:rPr lang="fr-CA" dirty="0"/>
+              <a:t>Opérateur d’assignation</a:t>
+            </a:r>
+          </a:p>
+        </p:txBody>
+      </p:sp>
+      <p:sp>
+        <p:nvSpPr>
+          <p:cNvPr id="5" name="Espace réservé du contenu 4">
+            <a:extLst>
+              <a:ext uri="{FF2B5EF4-FFF2-40B4-BE49-F238E27FC236}">
+                <a16:creationId xmlns:a16="http://schemas.microsoft.com/office/drawing/2014/main" id="{435D4A56-727A-932D-9B3C-6EFD41C8271F}"/>
+              </a:ext>
+            </a:extLst>
+          </p:cNvPr>
+          <p:cNvSpPr>
+            <a:spLocks noGrp="1"/>
+          </p:cNvSpPr>
+          <p:nvPr>
+            <p:ph idx="1"/>
+          </p:nvPr>
+        </p:nvSpPr>
+        <p:spPr>
+          <a:xfrm>
+            <a:off x="1115568" y="2038865"/>
+            <a:ext cx="10168128" cy="4133335"/>
+          </a:xfrm>
+        </p:spPr>
+        <p:txBody>
+          <a:bodyPr>
+            <a:normAutofit/>
+          </a:bodyPr>
+          <a:lstStyle/>
+          <a:p>
+            <a:r>
+              <a:rPr lang="fr-CA" dirty="0"/>
+              <a:t>L’opérateur d’assignation dans R est une flèche! Elle indique que le résultat de ce qui est produit à sa droite doit être emmagasiné dans un conteneur, une variable dont le nom figure à sa gauche.</a:t>
+            </a:r>
+          </a:p>
+          <a:p>
+            <a:r>
+              <a:rPr lang="fr-CA" dirty="0"/>
+              <a:t>Exemple:</a:t>
+            </a:r>
+          </a:p>
+          <a:p>
+            <a:pPr marL="0" indent="0">
+              <a:buNone/>
+            </a:pPr>
+            <a:endParaRPr lang="fr-CA" sz="1800" dirty="0">
+              <a:latin typeface="American Typewriter" panose="02090604020004020304" pitchFamily="18" charset="77"/>
+              <a:cs typeface="Arial" panose="020B0604020202020204" pitchFamily="34" charset="0"/>
+            </a:endParaRPr>
+          </a:p>
+          <a:p>
+            <a:pPr marL="0" indent="0">
+              <a:buNone/>
+            </a:pPr>
+            <a:r>
+              <a:rPr lang="fr-CA" dirty="0" err="1">
+                <a:latin typeface="American Typewriter" panose="02090604020004020304" pitchFamily="18" charset="77"/>
+                <a:cs typeface="Arial" panose="020B0604020202020204" pitchFamily="34" charset="0"/>
+              </a:rPr>
+              <a:t>premier_texte_xyz</a:t>
+            </a:r>
+            <a:r>
+              <a:rPr lang="fr-CA" dirty="0">
+                <a:latin typeface="American Typewriter" panose="02090604020004020304" pitchFamily="18" charset="77"/>
+                <a:cs typeface="Arial" panose="020B0604020202020204" pitchFamily="34" charset="0"/>
+              </a:rPr>
+              <a:t>        </a:t>
+            </a:r>
+            <a:r>
+              <a:rPr lang="fr-CA" b="1" dirty="0">
+                <a:highlight>
+                  <a:srgbClr val="FFFF00"/>
+                </a:highlight>
+                <a:latin typeface="American Typewriter" panose="02090604020004020304" pitchFamily="18" charset="77"/>
+                <a:cs typeface="Arial" panose="020B0604020202020204" pitchFamily="34" charset="0"/>
+              </a:rPr>
+              <a:t>&lt;-</a:t>
+            </a:r>
+            <a:r>
+              <a:rPr lang="fr-CA" dirty="0">
+                <a:latin typeface="American Typewriter" panose="02090604020004020304" pitchFamily="18" charset="77"/>
+                <a:cs typeface="Arial" panose="020B0604020202020204" pitchFamily="34" charset="0"/>
+              </a:rPr>
+              <a:t>       </a:t>
+            </a:r>
+            <a:r>
+              <a:rPr lang="fr-CA" dirty="0" err="1">
+                <a:latin typeface="American Typewriter" panose="02090604020004020304" pitchFamily="18" charset="77"/>
+                <a:cs typeface="Arial" panose="020B0604020202020204" pitchFamily="34" charset="0"/>
+              </a:rPr>
+              <a:t>corpus_xyz</a:t>
+            </a:r>
+            <a:r>
+              <a:rPr lang="fr-CA" dirty="0">
+                <a:latin typeface="American Typewriter" panose="02090604020004020304" pitchFamily="18" charset="77"/>
+                <a:cs typeface="Arial" panose="020B0604020202020204" pitchFamily="34" charset="0"/>
+              </a:rPr>
+              <a:t>[ 1, "</a:t>
+            </a:r>
+            <a:r>
+              <a:rPr lang="fr-CA" dirty="0" err="1">
+                <a:latin typeface="American Typewriter" panose="02090604020004020304" pitchFamily="18" charset="77"/>
+                <a:cs typeface="Arial" panose="020B0604020202020204" pitchFamily="34" charset="0"/>
+              </a:rPr>
+              <a:t>t</a:t>
+            </a:r>
+            <a:r>
+              <a:rPr lang="fr-CA" noProof="1">
+                <a:latin typeface="American Typewriter" panose="02090604020004020304" pitchFamily="18" charset="77"/>
+                <a:cs typeface="Arial" panose="020B0604020202020204" pitchFamily="34" charset="0"/>
+              </a:rPr>
+              <a:t>exte" ]</a:t>
+            </a:r>
+          </a:p>
+        </p:txBody>
+      </p:sp>
+      <p:sp>
+        <p:nvSpPr>
+          <p:cNvPr id="7" name="Flèche vers le haut 6">
+            <a:extLst>
+              <a:ext uri="{FF2B5EF4-FFF2-40B4-BE49-F238E27FC236}">
+                <a16:creationId xmlns:a16="http://schemas.microsoft.com/office/drawing/2014/main" id="{BAA04B77-8F40-8B51-B8ED-9C36BFCB8E53}"/>
+              </a:ext>
+            </a:extLst>
+          </p:cNvPr>
+          <p:cNvSpPr/>
+          <p:nvPr/>
+        </p:nvSpPr>
+        <p:spPr>
+          <a:xfrm>
+            <a:off x="2240095" y="5026350"/>
+            <a:ext cx="333633" cy="358346"/>
+          </a:xfrm>
+          <a:prstGeom prst="upArrow">
+            <a:avLst/>
+          </a:prstGeom>
+          <a:solidFill>
+            <a:schemeClr val="tx2"/>
+          </a:solidFill>
+          <a:ln>
+            <a:solidFill>
+              <a:schemeClr val="tx1"/>
+            </a:solidFill>
+          </a:ln>
+        </p:spPr>
+        <p:style>
+          <a:lnRef idx="2">
+            <a:schemeClr val="accent1">
+              <a:shade val="50000"/>
+            </a:schemeClr>
+          </a:lnRef>
+          <a:fillRef idx="1">
+            <a:schemeClr val="accent1"/>
+          </a:fillRef>
+          <a:effectRef idx="0">
+            <a:schemeClr val="accent1"/>
+          </a:effectRef>
+          <a:fontRef idx="minor">
+            <a:schemeClr val="lt1"/>
+          </a:fontRef>
+        </p:style>
+        <p:txBody>
+          <a:bodyPr rtlCol="0" anchor="ctr"/>
+          <a:lstStyle/>
+          <a:p>
+            <a:pPr algn="ctr"/>
+            <a:endParaRPr lang="fr-CA"/>
+          </a:p>
+        </p:txBody>
+      </p:sp>
+      <p:sp>
+        <p:nvSpPr>
+          <p:cNvPr id="8" name="Flèche vers le haut 7">
+            <a:extLst>
+              <a:ext uri="{FF2B5EF4-FFF2-40B4-BE49-F238E27FC236}">
+                <a16:creationId xmlns:a16="http://schemas.microsoft.com/office/drawing/2014/main" id="{ADB4A2B9-974A-7B29-A8F0-D4F32CDC9F53}"/>
+              </a:ext>
+            </a:extLst>
+          </p:cNvPr>
+          <p:cNvSpPr/>
+          <p:nvPr/>
+        </p:nvSpPr>
+        <p:spPr>
+          <a:xfrm>
+            <a:off x="4565521" y="5026350"/>
+            <a:ext cx="333633" cy="358346"/>
+          </a:xfrm>
+          <a:prstGeom prst="upArrow">
+            <a:avLst/>
+          </a:prstGeom>
+          <a:solidFill>
+            <a:schemeClr val="tx1"/>
+          </a:solidFill>
+        </p:spPr>
+        <p:style>
+          <a:lnRef idx="2">
+            <a:schemeClr val="accent1">
+              <a:shade val="50000"/>
+            </a:schemeClr>
+          </a:lnRef>
+          <a:fillRef idx="1">
+            <a:schemeClr val="accent1"/>
+          </a:fillRef>
+          <a:effectRef idx="0">
+            <a:schemeClr val="accent1"/>
+          </a:effectRef>
+          <a:fontRef idx="minor">
+            <a:schemeClr val="lt1"/>
+          </a:fontRef>
+        </p:style>
+        <p:txBody>
+          <a:bodyPr rtlCol="0" anchor="ctr"/>
+          <a:lstStyle/>
+          <a:p>
+            <a:pPr algn="ctr"/>
+            <a:endParaRPr lang="fr-CA"/>
+          </a:p>
+        </p:txBody>
+      </p:sp>
+      <p:sp>
+        <p:nvSpPr>
+          <p:cNvPr id="9" name="Flèche vers le haut 8">
+            <a:extLst>
+              <a:ext uri="{FF2B5EF4-FFF2-40B4-BE49-F238E27FC236}">
+                <a16:creationId xmlns:a16="http://schemas.microsoft.com/office/drawing/2014/main" id="{2A6EE37C-8199-1125-D73A-A94674012EE8}"/>
+              </a:ext>
+            </a:extLst>
+          </p:cNvPr>
+          <p:cNvSpPr/>
+          <p:nvPr/>
+        </p:nvSpPr>
+        <p:spPr>
+          <a:xfrm>
+            <a:off x="6818767" y="5026350"/>
+            <a:ext cx="333633" cy="358346"/>
+          </a:xfrm>
+          <a:prstGeom prst="upArrow">
+            <a:avLst/>
+          </a:prstGeom>
+          <a:solidFill>
+            <a:schemeClr val="tx1"/>
+          </a:solidFill>
+        </p:spPr>
+        <p:style>
+          <a:lnRef idx="2">
+            <a:schemeClr val="accent1">
+              <a:shade val="50000"/>
+            </a:schemeClr>
+          </a:lnRef>
+          <a:fillRef idx="1">
+            <a:schemeClr val="accent1"/>
+          </a:fillRef>
+          <a:effectRef idx="0">
+            <a:schemeClr val="accent1"/>
+          </a:effectRef>
+          <a:fontRef idx="minor">
+            <a:schemeClr val="lt1"/>
+          </a:fontRef>
+        </p:style>
+        <p:txBody>
+          <a:bodyPr rtlCol="0" anchor="ctr"/>
+          <a:lstStyle/>
+          <a:p>
+            <a:pPr algn="ctr"/>
+            <a:endParaRPr lang="fr-CA"/>
+          </a:p>
+        </p:txBody>
+      </p:sp>
+      <p:sp>
+        <p:nvSpPr>
+          <p:cNvPr id="10" name="ZoneTexte 9">
+            <a:extLst>
+              <a:ext uri="{FF2B5EF4-FFF2-40B4-BE49-F238E27FC236}">
+                <a16:creationId xmlns:a16="http://schemas.microsoft.com/office/drawing/2014/main" id="{7BC67604-5749-5BC4-B3C6-56D447B50DCB}"/>
+              </a:ext>
+            </a:extLst>
+          </p:cNvPr>
+          <p:cNvSpPr txBox="1"/>
+          <p:nvPr/>
+        </p:nvSpPr>
+        <p:spPr>
+          <a:xfrm>
+            <a:off x="1878896" y="5552062"/>
+            <a:ext cx="1056029" cy="307777"/>
+          </a:xfrm>
+          <a:prstGeom prst="rect">
+            <a:avLst/>
+          </a:prstGeom>
+          <a:solidFill>
+            <a:schemeClr val="accent6">
+              <a:alpha val="28942"/>
+            </a:schemeClr>
+          </a:solidFill>
+        </p:spPr>
+        <p:txBody>
+          <a:bodyPr wrap="square" rtlCol="0">
+            <a:spAutoFit/>
+          </a:bodyPr>
+          <a:lstStyle/>
+          <a:p>
+            <a:r>
+              <a:rPr lang="fr-CA" sz="1400" dirty="0">
+                <a:latin typeface="Monaco" pitchFamily="2" charset="77"/>
+              </a:rPr>
+              <a:t>variable</a:t>
+            </a:r>
+          </a:p>
+        </p:txBody>
+      </p:sp>
+      <p:sp>
+        <p:nvSpPr>
+          <p:cNvPr id="11" name="ZoneTexte 10">
+            <a:extLst>
+              <a:ext uri="{FF2B5EF4-FFF2-40B4-BE49-F238E27FC236}">
+                <a16:creationId xmlns:a16="http://schemas.microsoft.com/office/drawing/2014/main" id="{6CC4A089-A466-62F3-CC1E-B352B2F65CC3}"/>
+              </a:ext>
+            </a:extLst>
+          </p:cNvPr>
+          <p:cNvSpPr txBox="1"/>
+          <p:nvPr/>
+        </p:nvSpPr>
+        <p:spPr>
+          <a:xfrm>
+            <a:off x="3937200" y="5516838"/>
+            <a:ext cx="1590274" cy="523220"/>
+          </a:xfrm>
+          <a:prstGeom prst="rect">
+            <a:avLst/>
+          </a:prstGeom>
+          <a:solidFill>
+            <a:schemeClr val="accent6">
+              <a:alpha val="28942"/>
+            </a:schemeClr>
+          </a:solidFill>
+        </p:spPr>
+        <p:txBody>
+          <a:bodyPr wrap="square" rtlCol="0">
+            <a:spAutoFit/>
+          </a:bodyPr>
+          <a:lstStyle/>
+          <a:p>
+            <a:r>
+              <a:rPr lang="fr-CA" sz="1400" dirty="0">
+                <a:latin typeface="Monaco" pitchFamily="2" charset="77"/>
+              </a:rPr>
+              <a:t>Opérateur d’assignation</a:t>
+            </a:r>
+          </a:p>
+        </p:txBody>
+      </p:sp>
+      <p:sp>
+        <p:nvSpPr>
+          <p:cNvPr id="12" name="ZoneTexte 11">
+            <a:extLst>
+              <a:ext uri="{FF2B5EF4-FFF2-40B4-BE49-F238E27FC236}">
+                <a16:creationId xmlns:a16="http://schemas.microsoft.com/office/drawing/2014/main" id="{22F132EC-42F6-0782-5797-3F1E3CFE4EBB}"/>
+              </a:ext>
+            </a:extLst>
+          </p:cNvPr>
+          <p:cNvSpPr txBox="1"/>
+          <p:nvPr/>
+        </p:nvSpPr>
+        <p:spPr>
+          <a:xfrm>
+            <a:off x="6312002" y="5546125"/>
+            <a:ext cx="1380563" cy="307777"/>
+          </a:xfrm>
+          <a:prstGeom prst="rect">
+            <a:avLst/>
+          </a:prstGeom>
+          <a:solidFill>
+            <a:schemeClr val="accent6">
+              <a:alpha val="28942"/>
+            </a:schemeClr>
+          </a:solidFill>
+        </p:spPr>
+        <p:txBody>
+          <a:bodyPr wrap="square" rtlCol="0">
+            <a:spAutoFit/>
+          </a:bodyPr>
+          <a:lstStyle/>
+          <a:p>
+            <a:r>
+              <a:rPr lang="fr-CA" sz="1400" dirty="0">
+                <a:latin typeface="Monaco" pitchFamily="2" charset="77"/>
+              </a:rPr>
+              <a:t>instruction</a:t>
+            </a:r>
+          </a:p>
+        </p:txBody>
+      </p:sp>
+    </p:spTree>
+    <p:extLst>
+      <p:ext uri="{BB962C8B-B14F-4D97-AF65-F5344CB8AC3E}">
+        <p14:creationId xmlns:p14="http://schemas.microsoft.com/office/powerpoint/2010/main" val="2411237706"/>
+      </p:ext>
+    </p:extLst>
+  </p:cSld>
+  <p:clrMapOvr>
+    <a:masterClrMapping/>
+  </p:clrMapOvr>
+</p:sld>
+</file>
+
+<file path=ppt/slides/slide21.xml><?xml version="1.0" encoding="utf-8"?>
+<p:sld xmlns:a="http://schemas.openxmlformats.org/drawingml/2006/main" xmlns:r="http://schemas.openxmlformats.org/officeDocument/2006/relationships" xmlns:p="http://schemas.openxmlformats.org/presentationml/2006/main">
+  <p:cSld>
+    <p:spTree>
+      <p:nvGrpSpPr>
+        <p:cNvPr id="1" name=""/>
+        <p:cNvGrpSpPr/>
+        <p:nvPr/>
+      </p:nvGrpSpPr>
+      <p:grpSpPr>
+        <a:xfrm>
+          <a:off x="0" y="0"/>
+          <a:ext cx="0" cy="0"/>
+          <a:chOff x="0" y="0"/>
+          <a:chExt cx="0" cy="0"/>
+        </a:xfrm>
+      </p:grpSpPr>
+      <p:sp>
+        <p:nvSpPr>
+          <p:cNvPr id="2" name="Titre 1">
+            <a:extLst>
+              <a:ext uri="{FF2B5EF4-FFF2-40B4-BE49-F238E27FC236}">
+                <a16:creationId xmlns:a16="http://schemas.microsoft.com/office/drawing/2014/main" id="{64BE12C7-1932-7824-F6D2-D0275FFDA57F}"/>
+              </a:ext>
+            </a:extLst>
+          </p:cNvPr>
+          <p:cNvSpPr>
+            <a:spLocks noGrp="1"/>
+          </p:cNvSpPr>
+          <p:nvPr>
+            <p:ph type="title"/>
+          </p:nvPr>
+        </p:nvSpPr>
+        <p:spPr/>
+        <p:txBody>
           <a:bodyPr>
             <a:normAutofit fontScale="90000"/>
           </a:bodyPr>
@@ -25569,7 +25997,7 @@
 </p:sld>
 </file>
 
-<file path=ppt/slides/slide21.xml><?xml version="1.0" encoding="utf-8"?>
+<file path=ppt/slides/slide22.xml><?xml version="1.0" encoding="utf-8"?>
 <p:sld xmlns:a="http://schemas.openxmlformats.org/drawingml/2006/main" xmlns:r="http://schemas.openxmlformats.org/officeDocument/2006/relationships" xmlns:p="http://schemas.openxmlformats.org/presentationml/2006/main">
   <p:cSld>
     <p:spTree>
@@ -26165,7 +26593,7 @@
 </p:sld>
 </file>
 
-<file path=ppt/slides/slide22.xml><?xml version="1.0" encoding="utf-8"?>
+<file path=ppt/slides/slide23.xml><?xml version="1.0" encoding="utf-8"?>
 <p:sld xmlns:a="http://schemas.openxmlformats.org/drawingml/2006/main" xmlns:r="http://schemas.openxmlformats.org/officeDocument/2006/relationships" xmlns:p="http://schemas.openxmlformats.org/presentationml/2006/main">
   <p:cSld>
     <p:spTree>
@@ -26253,7 +26681,7 @@
 </p:sld>
 </file>
 
-<file path=ppt/slides/slide23.xml><?xml version="1.0" encoding="utf-8"?>
+<file path=ppt/slides/slide24.xml><?xml version="1.0" encoding="utf-8"?>
 <p:sld xmlns:a="http://schemas.openxmlformats.org/drawingml/2006/main" xmlns:r="http://schemas.openxmlformats.org/officeDocument/2006/relationships" xmlns:p="http://schemas.openxmlformats.org/presentationml/2006/main">
   <p:cSld>
     <p:bg>
@@ -27005,7 +27433,204 @@
 </p:sld>
 </file>
 
-<file path=ppt/slides/slide24.xml><?xml version="1.0" encoding="utf-8"?>
+<file path=ppt/slides/slide25.xml><?xml version="1.0" encoding="utf-8"?>
+<p:sld xmlns:a="http://schemas.openxmlformats.org/drawingml/2006/main" xmlns:r="http://schemas.openxmlformats.org/officeDocument/2006/relationships" xmlns:p="http://schemas.openxmlformats.org/presentationml/2006/main">
+  <p:cSld>
+    <p:spTree>
+      <p:nvGrpSpPr>
+        <p:cNvPr id="1" name=""/>
+        <p:cNvGrpSpPr/>
+        <p:nvPr/>
+      </p:nvGrpSpPr>
+      <p:grpSpPr>
+        <a:xfrm>
+          <a:off x="0" y="0"/>
+          <a:ext cx="0" cy="0"/>
+          <a:chOff x="0" y="0"/>
+          <a:chExt cx="0" cy="0"/>
+        </a:xfrm>
+      </p:grpSpPr>
+      <p:sp>
+        <p:nvSpPr>
+          <p:cNvPr id="2" name="Titre 1">
+            <a:extLst>
+              <a:ext uri="{FF2B5EF4-FFF2-40B4-BE49-F238E27FC236}">
+                <a16:creationId xmlns:a16="http://schemas.microsoft.com/office/drawing/2014/main" id="{CC8F254B-E56C-5CBC-4125-C5E25F54920C}"/>
+              </a:ext>
+            </a:extLst>
+          </p:cNvPr>
+          <p:cNvSpPr>
+            <a:spLocks noGrp="1"/>
+          </p:cNvSpPr>
+          <p:nvPr>
+            <p:ph type="title"/>
+          </p:nvPr>
+        </p:nvSpPr>
+        <p:spPr/>
+        <p:txBody>
+          <a:bodyPr/>
+          <a:lstStyle/>
+          <a:p>
+            <a:r>
+              <a:rPr lang="fr-CA" dirty="0"/>
+              <a:t>Outils d’exploration de l’atelier</a:t>
+            </a:r>
+          </a:p>
+        </p:txBody>
+      </p:sp>
+      <p:sp>
+        <p:nvSpPr>
+          <p:cNvPr id="3" name="Espace réservé du texte 2">
+            <a:extLst>
+              <a:ext uri="{FF2B5EF4-FFF2-40B4-BE49-F238E27FC236}">
+                <a16:creationId xmlns:a16="http://schemas.microsoft.com/office/drawing/2014/main" id="{D3CA5F59-CFF3-2186-6B0E-85F11F8CD986}"/>
+              </a:ext>
+            </a:extLst>
+          </p:cNvPr>
+          <p:cNvSpPr>
+            <a:spLocks noGrp="1"/>
+          </p:cNvSpPr>
+          <p:nvPr>
+            <p:ph type="body" idx="1"/>
+          </p:nvPr>
+        </p:nvSpPr>
+        <p:spPr/>
+        <p:txBody>
+          <a:bodyPr/>
+          <a:lstStyle/>
+          <a:p>
+            <a:r>
+              <a:rPr lang="fr-CA" dirty="0"/>
+              <a:t>Des fonctions (objets)</a:t>
+            </a:r>
+          </a:p>
+        </p:txBody>
+      </p:sp>
+      <p:sp>
+        <p:nvSpPr>
+          <p:cNvPr id="4" name="Espace réservé du contenu 3">
+            <a:extLst>
+              <a:ext uri="{FF2B5EF4-FFF2-40B4-BE49-F238E27FC236}">
+                <a16:creationId xmlns:a16="http://schemas.microsoft.com/office/drawing/2014/main" id="{BE7A889E-B48A-8308-1381-F2B85B1D6C01}"/>
+              </a:ext>
+            </a:extLst>
+          </p:cNvPr>
+          <p:cNvSpPr>
+            <a:spLocks noGrp="1"/>
+          </p:cNvSpPr>
+          <p:nvPr>
+            <p:ph sz="half" idx="2"/>
+          </p:nvPr>
+        </p:nvSpPr>
+        <p:spPr/>
+        <p:txBody>
+          <a:bodyPr/>
+          <a:lstStyle/>
+          <a:p>
+            <a:r>
+              <a:rPr lang="fr-CA" dirty="0" err="1"/>
+              <a:t>attributes</a:t>
+            </a:r>
+            <a:r>
+              <a:rPr lang="fr-CA" dirty="0"/>
+              <a:t>()</a:t>
+            </a:r>
+          </a:p>
+          <a:p>
+            <a:r>
+              <a:rPr lang="fr-CA" dirty="0"/>
+              <a:t>class()</a:t>
+            </a:r>
+          </a:p>
+          <a:p>
+            <a:r>
+              <a:rPr lang="fr-CA" dirty="0" err="1"/>
+              <a:t>dim</a:t>
+            </a:r>
+            <a:r>
+              <a:rPr lang="fr-CA" dirty="0"/>
+              <a:t>()</a:t>
+            </a:r>
+          </a:p>
+          <a:p>
+            <a:r>
+              <a:rPr lang="fr-CA"/>
+              <a:t>Etc.</a:t>
+            </a:r>
+            <a:endParaRPr lang="fr-CA" dirty="0"/>
+          </a:p>
+        </p:txBody>
+      </p:sp>
+      <p:sp>
+        <p:nvSpPr>
+          <p:cNvPr id="5" name="Espace réservé du texte 4">
+            <a:extLst>
+              <a:ext uri="{FF2B5EF4-FFF2-40B4-BE49-F238E27FC236}">
+                <a16:creationId xmlns:a16="http://schemas.microsoft.com/office/drawing/2014/main" id="{6840FE86-BA44-99F4-75B3-37FCB91FD14A}"/>
+              </a:ext>
+            </a:extLst>
+          </p:cNvPr>
+          <p:cNvSpPr>
+            <a:spLocks noGrp="1"/>
+          </p:cNvSpPr>
+          <p:nvPr>
+            <p:ph type="body" sz="quarter" idx="3"/>
+          </p:nvPr>
+        </p:nvSpPr>
+        <p:spPr/>
+        <p:txBody>
+          <a:bodyPr/>
+          <a:lstStyle/>
+          <a:p>
+            <a:r>
+              <a:rPr lang="fr-CA" dirty="0"/>
+              <a:t>Des stratégies d’exploration</a:t>
+            </a:r>
+          </a:p>
+        </p:txBody>
+      </p:sp>
+      <p:sp>
+        <p:nvSpPr>
+          <p:cNvPr id="6" name="Espace réservé du contenu 5">
+            <a:extLst>
+              <a:ext uri="{FF2B5EF4-FFF2-40B4-BE49-F238E27FC236}">
+                <a16:creationId xmlns:a16="http://schemas.microsoft.com/office/drawing/2014/main" id="{6148FBDF-14A9-F8A2-B671-D8ACDF20698F}"/>
+              </a:ext>
+            </a:extLst>
+          </p:cNvPr>
+          <p:cNvSpPr>
+            <a:spLocks noGrp="1"/>
+          </p:cNvSpPr>
+          <p:nvPr>
+            <p:ph sz="quarter" idx="4"/>
+          </p:nvPr>
+        </p:nvSpPr>
+        <p:spPr/>
+        <p:txBody>
+          <a:bodyPr/>
+          <a:lstStyle/>
+          <a:p>
+            <a:r>
+              <a:rPr lang="fr-CA" dirty="0"/>
+              <a:t>Enchainement d’opérations sur les objets données produisant… de nouveaux objets qui fourniront des informations inédites sur les données.</a:t>
+            </a:r>
+          </a:p>
+        </p:txBody>
+      </p:sp>
+    </p:spTree>
+    <p:extLst>
+      <p:ext uri="{BB962C8B-B14F-4D97-AF65-F5344CB8AC3E}">
+        <p14:creationId xmlns:p14="http://schemas.microsoft.com/office/powerpoint/2010/main" val="2272275667"/>
+      </p:ext>
+    </p:extLst>
+  </p:cSld>
+  <p:clrMapOvr>
+    <a:masterClrMapping/>
+  </p:clrMapOvr>
+</p:sld>
+</file>
+
+<file path=ppt/slides/slide26.xml><?xml version="1.0" encoding="utf-8"?>
 <p:sld xmlns:a="http://schemas.openxmlformats.org/drawingml/2006/main" xmlns:r="http://schemas.openxmlformats.org/officeDocument/2006/relationships" xmlns:p="http://schemas.openxmlformats.org/presentationml/2006/main">
   <p:cSld>
     <p:spTree>

</xml_diff>

<commit_message>
Clarification code + diapo
</commit_message>
<xml_diff>
--- a/Introduction_EDA_R.pptx
+++ b/Introduction_EDA_R.pptx
@@ -11998,7 +11998,7 @@
           <a:p>
             <a:fld id="{95F3A9C0-D7C5-1F4F-9ADD-323C3EAE9429}" type="datetimeFigureOut">
               <a:rPr lang="fr-CA" smtClean="0"/>
-              <a:t>2023-02-21</a:t>
+              <a:t>2023-02-22</a:t>
             </a:fld>
             <a:endParaRPr lang="fr-CA"/>
           </a:p>
@@ -12528,7 +12528,7 @@
           <a:p>
             <a:fld id="{02AC24A9-CCB6-4F8D-B8DB-C2F3692CFA5A}" type="datetimeFigureOut">
               <a:rPr lang="en-US" smtClean="0"/>
-              <a:t>2/21/23</a:t>
+              <a:t>2/22/23</a:t>
             </a:fld>
             <a:endParaRPr lang="en-US" dirty="0"/>
           </a:p>
@@ -12898,7 +12898,7 @@
           <a:p>
             <a:fld id="{02AC24A9-CCB6-4F8D-B8DB-C2F3692CFA5A}" type="datetimeFigureOut">
               <a:rPr lang="en-US" smtClean="0"/>
-              <a:t>2/21/23</a:t>
+              <a:t>2/22/23</a:t>
             </a:fld>
             <a:endParaRPr lang="en-US"/>
           </a:p>
@@ -13107,7 +13107,7 @@
           <a:p>
             <a:fld id="{02AC24A9-CCB6-4F8D-B8DB-C2F3692CFA5A}" type="datetimeFigureOut">
               <a:rPr lang="en-US" smtClean="0"/>
-              <a:t>2/21/23</a:t>
+              <a:t>2/22/23</a:t>
             </a:fld>
             <a:endParaRPr lang="en-US"/>
           </a:p>
@@ -13577,7 +13577,7 @@
           <a:p>
             <a:fld id="{02AC24A9-CCB6-4F8D-B8DB-C2F3692CFA5A}" type="datetimeFigureOut">
               <a:rPr lang="en-US" smtClean="0"/>
-              <a:t>2/21/23</a:t>
+              <a:t>2/22/23</a:t>
             </a:fld>
             <a:endParaRPr lang="en-US"/>
           </a:p>
@@ -14031,7 +14031,7 @@
           <a:p>
             <a:fld id="{02AC24A9-CCB6-4F8D-B8DB-C2F3692CFA5A}" type="datetimeFigureOut">
               <a:rPr lang="en-US" smtClean="0"/>
-              <a:t>2/21/23</a:t>
+              <a:t>2/22/23</a:t>
             </a:fld>
             <a:endParaRPr lang="en-US"/>
           </a:p>
@@ -14563,7 +14563,7 @@
           <a:p>
             <a:fld id="{02AC24A9-CCB6-4F8D-B8DB-C2F3692CFA5A}" type="datetimeFigureOut">
               <a:rPr lang="en-US" smtClean="0"/>
-              <a:t>2/21/23</a:t>
+              <a:t>2/22/23</a:t>
             </a:fld>
             <a:endParaRPr lang="en-US"/>
           </a:p>
@@ -15262,7 +15262,7 @@
           <a:p>
             <a:fld id="{02AC24A9-CCB6-4F8D-B8DB-C2F3692CFA5A}" type="datetimeFigureOut">
               <a:rPr lang="en-US" smtClean="0"/>
-              <a:t>2/21/23</a:t>
+              <a:t>2/22/23</a:t>
             </a:fld>
             <a:endParaRPr lang="en-US"/>
           </a:p>
@@ -15591,7 +15591,7 @@
           <a:p>
             <a:fld id="{02AC24A9-CCB6-4F8D-B8DB-C2F3692CFA5A}" type="datetimeFigureOut">
               <a:rPr lang="en-US" smtClean="0"/>
-              <a:t>2/21/23</a:t>
+              <a:t>2/22/23</a:t>
             </a:fld>
             <a:endParaRPr lang="en-US"/>
           </a:p>
@@ -15704,7 +15704,7 @@
           <a:p>
             <a:fld id="{02AC24A9-CCB6-4F8D-B8DB-C2F3692CFA5A}" type="datetimeFigureOut">
               <a:rPr lang="en-US" smtClean="0"/>
-              <a:t>2/21/23</a:t>
+              <a:t>2/22/23</a:t>
             </a:fld>
             <a:endParaRPr lang="en-US"/>
           </a:p>
@@ -16199,7 +16199,7 @@
           <a:p>
             <a:fld id="{02AC24A9-CCB6-4F8D-B8DB-C2F3692CFA5A}" type="datetimeFigureOut">
               <a:rPr lang="en-US" smtClean="0"/>
-              <a:t>2/21/23</a:t>
+              <a:t>2/22/23</a:t>
             </a:fld>
             <a:endParaRPr lang="en-US" dirty="0"/>
           </a:p>
@@ -16676,7 +16676,7 @@
           <a:p>
             <a:fld id="{02AC24A9-CCB6-4F8D-B8DB-C2F3692CFA5A}" type="datetimeFigureOut">
               <a:rPr lang="en-US" smtClean="0"/>
-              <a:t>2/21/23</a:t>
+              <a:t>2/22/23</a:t>
             </a:fld>
             <a:endParaRPr lang="en-US"/>
           </a:p>
@@ -16919,7 +16919,7 @@
           <a:p>
             <a:fld id="{02AC24A9-CCB6-4F8D-B8DB-C2F3692CFA5A}" type="datetimeFigureOut">
               <a:rPr lang="en-US" smtClean="0"/>
-              <a:t>2/21/23</a:t>
+              <a:t>2/22/23</a:t>
             </a:fld>
             <a:endParaRPr lang="en-US"/>
           </a:p>
@@ -21437,14 +21437,14 @@
           <p:nvPr>
             <p:extLst>
               <p:ext uri="{D42A27DB-BD31-4B8C-83A1-F6EECF244321}">
-                <p14:modId xmlns:p14="http://schemas.microsoft.com/office/powerpoint/2010/main" val="3410990877"/>
+                <p14:modId xmlns:p14="http://schemas.microsoft.com/office/powerpoint/2010/main" val="3468856517"/>
               </p:ext>
             </p:extLst>
           </p:nvPr>
         </p:nvGraphicFramePr>
         <p:xfrm>
-          <a:off x="4980237" y="1579999"/>
-          <a:ext cx="5114380" cy="1644337"/>
+          <a:off x="4958738" y="2354086"/>
+          <a:ext cx="5114380" cy="457200"/>
         </p:xfrm>
         <a:graphic>
           <a:graphicData uri="http://schemas.openxmlformats.org/drawingml/2006/table">
@@ -21468,7 +21468,7 @@
                   </a:extLst>
                 </a:gridCol>
               </a:tblGrid>
-              <a:tr h="320780">
+              <a:tr h="0">
                 <a:tc>
                   <a:txBody>
                     <a:bodyPr/>
@@ -21476,7 +21476,7 @@
                     <a:p>
                       <a:pPr algn="ctr"/>
                       <a:r>
-                        <a:rPr lang="fr-CA" sz="1200" dirty="0">
+                        <a:rPr lang="fr-CA" sz="2400" dirty="0">
                           <a:highlight>
                             <a:srgbClr val="FFFF00"/>
                           </a:highlight>
@@ -21495,7 +21495,7 @@
                     <a:p>
                       <a:pPr algn="ctr"/>
                       <a:r>
-                        <a:rPr lang="fr-CA" sz="1200" dirty="0">
+                        <a:rPr lang="fr-CA" sz="2400" dirty="0">
                           <a:highlight>
                             <a:srgbClr val="FFFF00"/>
                           </a:highlight>
@@ -21510,198 +21510,6 @@
                 <a:extLst>
                   <a:ext uri="{0D108BD9-81ED-4DB2-BD59-A6C34878D82A}">
                     <a16:rowId xmlns:a16="http://schemas.microsoft.com/office/drawing/2014/main" val="1084043891"/>
-                  </a:ext>
-                </a:extLst>
-              </a:tr>
-              <a:tr h="320780">
-                <a:tc>
-                  <a:txBody>
-                    <a:bodyPr/>
-                    <a:lstStyle/>
-                    <a:p>
-                      <a:pPr algn="ctr"/>
-                      <a:r>
-                        <a:rPr lang="fr-CA" sz="1200" dirty="0">
-                          <a:latin typeface="Courier" pitchFamily="2" charset="0"/>
-                        </a:rPr>
-                        <a:t>1:3</a:t>
-                      </a:r>
-                    </a:p>
-                  </a:txBody>
-                  <a:tcPr/>
-                </a:tc>
-                <a:tc>
-                  <a:txBody>
-                    <a:bodyPr/>
-                    <a:lstStyle/>
-                    <a:p>
-                      <a:pPr algn="ctr"/>
-                      <a:r>
-                        <a:rPr lang="fr-CA" sz="1200" dirty="0">
-                          <a:latin typeface="Courier" pitchFamily="2" charset="0"/>
-                        </a:rPr>
-                        <a:t>1:2</a:t>
-                      </a:r>
-                    </a:p>
-                  </a:txBody>
-                  <a:tcPr/>
-                </a:tc>
-                <a:extLst>
-                  <a:ext uri="{0D108BD9-81ED-4DB2-BD59-A6C34878D82A}">
-                    <a16:rowId xmlns:a16="http://schemas.microsoft.com/office/drawing/2014/main" val="2017206795"/>
-                  </a:ext>
-                </a:extLst>
-              </a:tr>
-              <a:tr h="320780">
-                <a:tc>
-                  <a:txBody>
-                    <a:bodyPr/>
-                    <a:lstStyle/>
-                    <a:p>
-                      <a:pPr algn="ctr"/>
-                      <a:r>
-                        <a:rPr lang="fr-CA" sz="1200" dirty="0">
-                          <a:latin typeface="Courier" pitchFamily="2" charset="0"/>
-                        </a:rPr>
-                        <a:t>c(1, 4)</a:t>
-                      </a:r>
-                    </a:p>
-                  </a:txBody>
-                  <a:tcPr/>
-                </a:tc>
-                <a:tc>
-                  <a:txBody>
-                    <a:bodyPr/>
-                    <a:lstStyle/>
-                    <a:p>
-                      <a:pPr algn="ctr"/>
-                      <a:r>
-                        <a:rPr lang="fr-CA" sz="1200" dirty="0">
-                          <a:latin typeface="Courier" pitchFamily="2" charset="0"/>
-                        </a:rPr>
-                        <a:t>c(1, 2)</a:t>
-                      </a:r>
-                    </a:p>
-                  </a:txBody>
-                  <a:tcPr/>
-                </a:tc>
-                <a:extLst>
-                  <a:ext uri="{0D108BD9-81ED-4DB2-BD59-A6C34878D82A}">
-                    <a16:rowId xmlns:a16="http://schemas.microsoft.com/office/drawing/2014/main" val="1078201899"/>
-                  </a:ext>
-                </a:extLst>
-              </a:tr>
-              <a:tr h="320780">
-                <a:tc>
-                  <a:txBody>
-                    <a:bodyPr/>
-                    <a:lstStyle/>
-                    <a:p>
-                      <a:pPr algn="ctr"/>
-                      <a:r>
-                        <a:rPr lang="fr-CA" sz="1200" dirty="0">
-                          <a:latin typeface="Courier" pitchFamily="2" charset="0"/>
-                        </a:rPr>
-                        <a:t>2</a:t>
-                      </a:r>
-                    </a:p>
-                  </a:txBody>
-                  <a:tcPr/>
-                </a:tc>
-                <a:tc>
-                  <a:txBody>
-                    <a:bodyPr/>
-                    <a:lstStyle/>
-                    <a:p>
-                      <a:pPr algn="ctr"/>
-                      <a:r>
-                        <a:rPr lang="fr-CA" sz="1200" dirty="0">
-                          <a:latin typeface="Courier" pitchFamily="2" charset="0"/>
-                        </a:rPr>
-                        <a:t>`</a:t>
-                      </a:r>
-                      <a:r>
-                        <a:rPr lang="fr-CA" sz="1200" dirty="0" err="1">
-                          <a:latin typeface="Courier" pitchFamily="2" charset="0"/>
-                        </a:rPr>
-                        <a:t>auteur.trice</a:t>
-                      </a:r>
-                      <a:r>
-                        <a:rPr lang="fr-CA" sz="1200" dirty="0">
-                          <a:latin typeface="Courier" pitchFamily="2" charset="0"/>
-                        </a:rPr>
-                        <a:t>` </a:t>
-                      </a:r>
-                    </a:p>
-                  </a:txBody>
-                  <a:tcPr/>
-                </a:tc>
-                <a:extLst>
-                  <a:ext uri="{0D108BD9-81ED-4DB2-BD59-A6C34878D82A}">
-                    <a16:rowId xmlns:a16="http://schemas.microsoft.com/office/drawing/2014/main" val="3399532434"/>
-                  </a:ext>
-                </a:extLst>
-              </a:tr>
-              <a:tr h="361217">
-                <a:tc>
-                  <a:txBody>
-                    <a:bodyPr/>
-                    <a:lstStyle/>
-                    <a:p>
-                      <a:pPr algn="ctr"/>
-                      <a:r>
-                        <a:rPr lang="fr-CA" sz="1200" dirty="0">
-                          <a:latin typeface="Courier" pitchFamily="2" charset="0"/>
-                        </a:rPr>
-                        <a:t>c(1, 3)</a:t>
-                      </a:r>
-                    </a:p>
-                  </a:txBody>
-                  <a:tcPr/>
-                </a:tc>
-                <a:tc>
-                  <a:txBody>
-                    <a:bodyPr/>
-                    <a:lstStyle/>
-                    <a:p>
-                      <a:pPr algn="ctr"/>
-                      <a:r>
-                        <a:rPr lang="fr-CA" sz="1200" dirty="0">
-                          <a:latin typeface="Courier" pitchFamily="2" charset="0"/>
-                        </a:rPr>
-                        <a:t>c(`</a:t>
-                      </a:r>
-                      <a:r>
-                        <a:rPr lang="fr-CA" sz="1200" dirty="0" err="1">
-                          <a:latin typeface="Courier" pitchFamily="2" charset="0"/>
-                        </a:rPr>
-                        <a:t>oeuvre</a:t>
-                      </a:r>
-                      <a:r>
-                        <a:rPr lang="fr-CA" sz="1200" dirty="0">
-                          <a:latin typeface="Courier" pitchFamily="2" charset="0"/>
-                        </a:rPr>
-                        <a:t>`, `</a:t>
-                      </a:r>
-                      <a:r>
-                        <a:rPr lang="fr-CA" sz="1200" dirty="0" err="1">
-                          <a:latin typeface="Courier" pitchFamily="2" charset="0"/>
-                        </a:rPr>
-                        <a:t>est.femme</a:t>
-                      </a:r>
-                      <a:r>
-                        <a:rPr lang="fr-CA" sz="1200" dirty="0">
-                          <a:latin typeface="Courier" pitchFamily="2" charset="0"/>
-                        </a:rPr>
-                        <a:t>`)</a:t>
-                      </a:r>
-                    </a:p>
-                  </a:txBody>
-                  <a:tcPr/>
-                </a:tc>
-                <a:extLst>
-                  <a:ext uri="{0D108BD9-81ED-4DB2-BD59-A6C34878D82A}">
-                    <a16:rowId xmlns:a16="http://schemas.microsoft.com/office/drawing/2014/main" val="3336460639"/>
                   </a:ext>
                 </a:extLst>
               </a:tr>
@@ -22101,14 +21909,14 @@
           <p:nvPr>
             <p:extLst>
               <p:ext uri="{D42A27DB-BD31-4B8C-83A1-F6EECF244321}">
-                <p14:modId xmlns:p14="http://schemas.microsoft.com/office/powerpoint/2010/main" val="4090920641"/>
+                <p14:modId xmlns:p14="http://schemas.microsoft.com/office/powerpoint/2010/main" val="818702728"/>
               </p:ext>
             </p:extLst>
           </p:nvPr>
         </p:nvGraphicFramePr>
         <p:xfrm>
-          <a:off x="4980237" y="1579999"/>
-          <a:ext cx="5114380" cy="1644337"/>
+          <a:off x="4958738" y="2476533"/>
+          <a:ext cx="5114380" cy="457200"/>
         </p:xfrm>
         <a:graphic>
           <a:graphicData uri="http://schemas.openxmlformats.org/drawingml/2006/table">
@@ -22140,46 +21948,7 @@
                     <a:p>
                       <a:pPr algn="ctr"/>
                       <a:r>
-                        <a:rPr lang="fr-CA" sz="1200" dirty="0">
-                          <a:latin typeface="Courier" pitchFamily="2" charset="0"/>
-                        </a:rPr>
-                        <a:t>1</a:t>
-                      </a:r>
-                    </a:p>
-                  </a:txBody>
-                  <a:tcPr/>
-                </a:tc>
-                <a:tc>
-                  <a:txBody>
-                    <a:bodyPr/>
-                    <a:lstStyle/>
-                    <a:p>
-                      <a:pPr algn="ctr"/>
-                      <a:r>
-                        <a:rPr lang="fr-CA" sz="1200" dirty="0">
-                          <a:latin typeface="Courier" pitchFamily="2" charset="0"/>
-                        </a:rPr>
-                        <a:t>1</a:t>
-                      </a:r>
-                    </a:p>
-                  </a:txBody>
-                  <a:tcPr/>
-                </a:tc>
-                <a:extLst>
-                  <a:ext uri="{0D108BD9-81ED-4DB2-BD59-A6C34878D82A}">
-                    <a16:rowId xmlns:a16="http://schemas.microsoft.com/office/drawing/2014/main" val="1084043891"/>
-                  </a:ext>
-                </a:extLst>
-              </a:tr>
-              <a:tr h="320780">
-                <a:tc>
-                  <a:txBody>
-                    <a:bodyPr/>
-                    <a:lstStyle/>
-                    <a:p>
-                      <a:pPr algn="ctr"/>
-                      <a:r>
-                        <a:rPr lang="fr-CA" sz="1200" dirty="0">
+                        <a:rPr lang="fr-CA" sz="2400" dirty="0">
                           <a:highlight>
                             <a:srgbClr val="FFFF00"/>
                           </a:highlight>
@@ -22198,7 +21967,7 @@
                     <a:p>
                       <a:pPr algn="ctr"/>
                       <a:r>
-                        <a:rPr lang="fr-CA" sz="1200" dirty="0">
+                        <a:rPr lang="fr-CA" sz="2400" dirty="0">
                           <a:highlight>
                             <a:srgbClr val="FFFF00"/>
                           </a:highlight>
@@ -22213,159 +21982,6 @@
                 <a:extLst>
                   <a:ext uri="{0D108BD9-81ED-4DB2-BD59-A6C34878D82A}">
                     <a16:rowId xmlns:a16="http://schemas.microsoft.com/office/drawing/2014/main" val="2017206795"/>
-                  </a:ext>
-                </a:extLst>
-              </a:tr>
-              <a:tr h="320780">
-                <a:tc>
-                  <a:txBody>
-                    <a:bodyPr/>
-                    <a:lstStyle/>
-                    <a:p>
-                      <a:pPr algn="ctr"/>
-                      <a:r>
-                        <a:rPr lang="fr-CA" sz="1200" dirty="0">
-                          <a:latin typeface="Courier" pitchFamily="2" charset="0"/>
-                        </a:rPr>
-                        <a:t>c(1, 4)</a:t>
-                      </a:r>
-                    </a:p>
-                  </a:txBody>
-                  <a:tcPr/>
-                </a:tc>
-                <a:tc>
-                  <a:txBody>
-                    <a:bodyPr/>
-                    <a:lstStyle/>
-                    <a:p>
-                      <a:pPr algn="ctr"/>
-                      <a:r>
-                        <a:rPr lang="fr-CA" sz="1200" dirty="0">
-                          <a:latin typeface="Courier" pitchFamily="2" charset="0"/>
-                        </a:rPr>
-                        <a:t>c(1, 2)</a:t>
-                      </a:r>
-                    </a:p>
-                  </a:txBody>
-                  <a:tcPr/>
-                </a:tc>
-                <a:extLst>
-                  <a:ext uri="{0D108BD9-81ED-4DB2-BD59-A6C34878D82A}">
-                    <a16:rowId xmlns:a16="http://schemas.microsoft.com/office/drawing/2014/main" val="1078201899"/>
-                  </a:ext>
-                </a:extLst>
-              </a:tr>
-              <a:tr h="320780">
-                <a:tc>
-                  <a:txBody>
-                    <a:bodyPr/>
-                    <a:lstStyle/>
-                    <a:p>
-                      <a:pPr algn="ctr"/>
-                      <a:r>
-                        <a:rPr lang="fr-CA" sz="1200" dirty="0">
-                          <a:latin typeface="Courier" pitchFamily="2" charset="0"/>
-                        </a:rPr>
-                        <a:t>2</a:t>
-                      </a:r>
-                    </a:p>
-                  </a:txBody>
-                  <a:tcPr/>
-                </a:tc>
-                <a:tc>
-                  <a:txBody>
-                    <a:bodyPr/>
-                    <a:lstStyle/>
-                    <a:p>
-                      <a:pPr algn="ctr"/>
-                      <a:r>
-                        <a:rPr lang="fr-CA" sz="1200" dirty="0">
-                          <a:latin typeface="Courier" pitchFamily="2" charset="0"/>
-                        </a:rPr>
-                        <a:t>`</a:t>
-                      </a:r>
-                      <a:r>
-                        <a:rPr lang="fr-CA" sz="1200" dirty="0" err="1">
-                          <a:latin typeface="Courier" pitchFamily="2" charset="0"/>
-                        </a:rPr>
-                        <a:t>auteur.trice</a:t>
-                      </a:r>
-                      <a:r>
-                        <a:rPr lang="fr-CA" sz="1200" dirty="0">
-                          <a:latin typeface="Courier" pitchFamily="2" charset="0"/>
-                        </a:rPr>
-                        <a:t>` </a:t>
-                      </a:r>
-                    </a:p>
-                  </a:txBody>
-                  <a:tcPr/>
-                </a:tc>
-                <a:extLst>
-                  <a:ext uri="{0D108BD9-81ED-4DB2-BD59-A6C34878D82A}">
-                    <a16:rowId xmlns:a16="http://schemas.microsoft.com/office/drawing/2014/main" val="3399532434"/>
-                  </a:ext>
-                </a:extLst>
-              </a:tr>
-              <a:tr h="361217">
-                <a:tc>
-                  <a:txBody>
-                    <a:bodyPr/>
-                    <a:lstStyle/>
-                    <a:p>
-                      <a:pPr algn="ctr"/>
-                      <a:r>
-                        <a:rPr lang="fr-CA" sz="1200" dirty="0">
-                          <a:latin typeface="Courier" pitchFamily="2" charset="0"/>
-                        </a:rPr>
-                        <a:t>c(1, 3)</a:t>
-                      </a:r>
-                    </a:p>
-                  </a:txBody>
-                  <a:tcPr/>
-                </a:tc>
-                <a:tc>
-                  <a:txBody>
-                    <a:bodyPr/>
-                    <a:lstStyle/>
-                    <a:p>
-                      <a:pPr algn="ctr"/>
-                      <a:r>
-                        <a:rPr lang="fr-CA" sz="1200" dirty="0">
-                          <a:latin typeface="Courier" pitchFamily="2" charset="0"/>
-                        </a:rPr>
-                        <a:t>c(`</a:t>
-                      </a:r>
-                      <a:r>
-                        <a:rPr lang="fr-CA" sz="1200" dirty="0" err="1">
-                          <a:latin typeface="Courier" pitchFamily="2" charset="0"/>
-                        </a:rPr>
-                        <a:t>oeuvre</a:t>
-                      </a:r>
-                      <a:r>
-                        <a:rPr lang="fr-CA" sz="1200" dirty="0">
-                          <a:latin typeface="Courier" pitchFamily="2" charset="0"/>
-                        </a:rPr>
-                        <a:t>`, `</a:t>
-                      </a:r>
-                      <a:r>
-                        <a:rPr lang="fr-CA" sz="1200" dirty="0" err="1">
-                          <a:latin typeface="Courier" pitchFamily="2" charset="0"/>
-                        </a:rPr>
-                        <a:t>est.femme</a:t>
-                      </a:r>
-                      <a:r>
-                        <a:rPr lang="fr-CA" sz="1200" dirty="0">
-                          <a:latin typeface="Courier" pitchFamily="2" charset="0"/>
-                        </a:rPr>
-                        <a:t>`)</a:t>
-                      </a:r>
-                    </a:p>
-                  </a:txBody>
-                  <a:tcPr/>
-                </a:tc>
-                <a:extLst>
-                  <a:ext uri="{0D108BD9-81ED-4DB2-BD59-A6C34878D82A}">
-                    <a16:rowId xmlns:a16="http://schemas.microsoft.com/office/drawing/2014/main" val="3336460639"/>
                   </a:ext>
                 </a:extLst>
               </a:tr>
@@ -23020,14 +22636,14 @@
           <p:nvPr>
             <p:extLst>
               <p:ext uri="{D42A27DB-BD31-4B8C-83A1-F6EECF244321}">
-                <p14:modId xmlns:p14="http://schemas.microsoft.com/office/powerpoint/2010/main" val="4146083072"/>
+                <p14:modId xmlns:p14="http://schemas.microsoft.com/office/powerpoint/2010/main" val="862160193"/>
               </p:ext>
             </p:extLst>
           </p:nvPr>
         </p:nvGraphicFramePr>
         <p:xfrm>
-          <a:off x="4980237" y="1579999"/>
-          <a:ext cx="5114380" cy="1644337"/>
+          <a:off x="4958738" y="2423637"/>
+          <a:ext cx="5114380" cy="457200"/>
         </p:xfrm>
         <a:graphic>
           <a:graphicData uri="http://schemas.openxmlformats.org/drawingml/2006/table">
@@ -23059,85 +22675,7 @@
                     <a:p>
                       <a:pPr algn="ctr"/>
                       <a:r>
-                        <a:rPr lang="fr-CA" sz="1200" dirty="0">
-                          <a:latin typeface="Courier" pitchFamily="2" charset="0"/>
-                        </a:rPr>
-                        <a:t>1</a:t>
-                      </a:r>
-                    </a:p>
-                  </a:txBody>
-                  <a:tcPr/>
-                </a:tc>
-                <a:tc>
-                  <a:txBody>
-                    <a:bodyPr/>
-                    <a:lstStyle/>
-                    <a:p>
-                      <a:pPr algn="ctr"/>
-                      <a:r>
-                        <a:rPr lang="fr-CA" sz="1200" dirty="0">
-                          <a:latin typeface="Courier" pitchFamily="2" charset="0"/>
-                        </a:rPr>
-                        <a:t>1</a:t>
-                      </a:r>
-                    </a:p>
-                  </a:txBody>
-                  <a:tcPr/>
-                </a:tc>
-                <a:extLst>
-                  <a:ext uri="{0D108BD9-81ED-4DB2-BD59-A6C34878D82A}">
-                    <a16:rowId xmlns:a16="http://schemas.microsoft.com/office/drawing/2014/main" val="1084043891"/>
-                  </a:ext>
-                </a:extLst>
-              </a:tr>
-              <a:tr h="320780">
-                <a:tc>
-                  <a:txBody>
-                    <a:bodyPr/>
-                    <a:lstStyle/>
-                    <a:p>
-                      <a:pPr algn="ctr"/>
-                      <a:r>
-                        <a:rPr lang="fr-CA" sz="1200" dirty="0">
-                          <a:latin typeface="Courier" pitchFamily="2" charset="0"/>
-                        </a:rPr>
-                        <a:t>1:3</a:t>
-                      </a:r>
-                    </a:p>
-                  </a:txBody>
-                  <a:tcPr/>
-                </a:tc>
-                <a:tc>
-                  <a:txBody>
-                    <a:bodyPr/>
-                    <a:lstStyle/>
-                    <a:p>
-                      <a:pPr algn="ctr"/>
-                      <a:r>
-                        <a:rPr lang="fr-CA" sz="1200" dirty="0">
-                          <a:latin typeface="Courier" pitchFamily="2" charset="0"/>
-                        </a:rPr>
-                        <a:t>1:2</a:t>
-                      </a:r>
-                    </a:p>
-                  </a:txBody>
-                  <a:tcPr/>
-                </a:tc>
-                <a:extLst>
-                  <a:ext uri="{0D108BD9-81ED-4DB2-BD59-A6C34878D82A}">
-                    <a16:rowId xmlns:a16="http://schemas.microsoft.com/office/drawing/2014/main" val="2017206795"/>
-                  </a:ext>
-                </a:extLst>
-              </a:tr>
-              <a:tr h="320780">
-                <a:tc>
-                  <a:txBody>
-                    <a:bodyPr/>
-                    <a:lstStyle/>
-                    <a:p>
-                      <a:pPr algn="ctr"/>
-                      <a:r>
-                        <a:rPr lang="fr-CA" sz="1200" dirty="0">
+                        <a:rPr lang="fr-CA" sz="2400" dirty="0">
                           <a:highlight>
                             <a:srgbClr val="FFFF00"/>
                           </a:highlight>
@@ -23156,7 +22694,7 @@
                     <a:p>
                       <a:pPr algn="ctr"/>
                       <a:r>
-                        <a:rPr lang="fr-CA" sz="1200" dirty="0">
+                        <a:rPr lang="fr-CA" sz="2400" dirty="0">
                           <a:highlight>
                             <a:srgbClr val="FFFF00"/>
                           </a:highlight>
@@ -23171,120 +22709,6 @@
                 <a:extLst>
                   <a:ext uri="{0D108BD9-81ED-4DB2-BD59-A6C34878D82A}">
                     <a16:rowId xmlns:a16="http://schemas.microsoft.com/office/drawing/2014/main" val="1078201899"/>
-                  </a:ext>
-                </a:extLst>
-              </a:tr>
-              <a:tr h="320780">
-                <a:tc>
-                  <a:txBody>
-                    <a:bodyPr/>
-                    <a:lstStyle/>
-                    <a:p>
-                      <a:pPr algn="ctr"/>
-                      <a:r>
-                        <a:rPr lang="fr-CA" sz="1200" dirty="0">
-                          <a:latin typeface="Courier" pitchFamily="2" charset="0"/>
-                        </a:rPr>
-                        <a:t>2</a:t>
-                      </a:r>
-                    </a:p>
-                  </a:txBody>
-                  <a:tcPr/>
-                </a:tc>
-                <a:tc>
-                  <a:txBody>
-                    <a:bodyPr/>
-                    <a:lstStyle/>
-                    <a:p>
-                      <a:pPr algn="ctr"/>
-                      <a:r>
-                        <a:rPr lang="fr-CA" sz="1200" dirty="0">
-                          <a:latin typeface="Courier" pitchFamily="2" charset="0"/>
-                        </a:rPr>
-                        <a:t>`</a:t>
-                      </a:r>
-                      <a:r>
-                        <a:rPr lang="fr-CA" sz="1200" dirty="0" err="1">
-                          <a:latin typeface="Courier" pitchFamily="2" charset="0"/>
-                        </a:rPr>
-                        <a:t>auteur.trice</a:t>
-                      </a:r>
-                      <a:r>
-                        <a:rPr lang="fr-CA" sz="1200" dirty="0">
-                          <a:latin typeface="Courier" pitchFamily="2" charset="0"/>
-                        </a:rPr>
-                        <a:t>` </a:t>
-                      </a:r>
-                    </a:p>
-                  </a:txBody>
-                  <a:tcPr/>
-                </a:tc>
-                <a:extLst>
-                  <a:ext uri="{0D108BD9-81ED-4DB2-BD59-A6C34878D82A}">
-                    <a16:rowId xmlns:a16="http://schemas.microsoft.com/office/drawing/2014/main" val="3399532434"/>
-                  </a:ext>
-                </a:extLst>
-              </a:tr>
-              <a:tr h="361217">
-                <a:tc>
-                  <a:txBody>
-                    <a:bodyPr/>
-                    <a:lstStyle/>
-                    <a:p>
-                      <a:pPr algn="ctr"/>
-                      <a:r>
-                        <a:rPr lang="fr-CA" sz="1200" dirty="0">
-                          <a:latin typeface="Courier" pitchFamily="2" charset="0"/>
-                        </a:rPr>
-                        <a:t>c(1, 3)</a:t>
-                      </a:r>
-                    </a:p>
-                  </a:txBody>
-                  <a:tcPr/>
-                </a:tc>
-                <a:tc>
-                  <a:txBody>
-                    <a:bodyPr/>
-                    <a:lstStyle/>
-                    <a:p>
-                      <a:pPr algn="ctr"/>
-                      <a:r>
-                        <a:rPr lang="fr-CA" sz="1200" dirty="0">
-                          <a:latin typeface="Courier" pitchFamily="2" charset="0"/>
-                        </a:rPr>
-                        <a:t>c(`</a:t>
-                      </a:r>
-                      <a:r>
-                        <a:rPr lang="fr-CA" sz="1200" dirty="0" err="1">
-                          <a:latin typeface="Courier" pitchFamily="2" charset="0"/>
-                        </a:rPr>
-                        <a:t>oeuvre</a:t>
-                      </a:r>
-                      <a:r>
-                        <a:rPr lang="fr-CA" sz="1200" dirty="0">
-                          <a:latin typeface="Courier" pitchFamily="2" charset="0"/>
-                        </a:rPr>
-                        <a:t>`, `</a:t>
-                      </a:r>
-                      <a:r>
-                        <a:rPr lang="fr-CA" sz="1200" dirty="0" err="1">
-                          <a:latin typeface="Courier" pitchFamily="2" charset="0"/>
-                        </a:rPr>
-                        <a:t>est.femme</a:t>
-                      </a:r>
-                      <a:r>
-                        <a:rPr lang="fr-CA" sz="1200" dirty="0">
-                          <a:latin typeface="Courier" pitchFamily="2" charset="0"/>
-                        </a:rPr>
-                        <a:t>`)</a:t>
-                      </a:r>
-                    </a:p>
-                  </a:txBody>
-                  <a:tcPr/>
-                </a:tc>
-                <a:extLst>
-                  <a:ext uri="{0D108BD9-81ED-4DB2-BD59-A6C34878D82A}">
-                    <a16:rowId xmlns:a16="http://schemas.microsoft.com/office/drawing/2014/main" val="3336460639"/>
                   </a:ext>
                 </a:extLst>
               </a:tr>
@@ -23837,14 +23261,14 @@
           <p:nvPr>
             <p:extLst>
               <p:ext uri="{D42A27DB-BD31-4B8C-83A1-F6EECF244321}">
-                <p14:modId xmlns:p14="http://schemas.microsoft.com/office/powerpoint/2010/main" val="3762587750"/>
+                <p14:modId xmlns:p14="http://schemas.microsoft.com/office/powerpoint/2010/main" val="1256521485"/>
               </p:ext>
             </p:extLst>
           </p:nvPr>
         </p:nvGraphicFramePr>
         <p:xfrm>
-          <a:off x="4980237" y="1579999"/>
-          <a:ext cx="5114380" cy="1644337"/>
+          <a:off x="4958738" y="2322788"/>
+          <a:ext cx="5114380" cy="822960"/>
         </p:xfrm>
         <a:graphic>
           <a:graphicData uri="http://schemas.openxmlformats.org/drawingml/2006/table">
@@ -23876,124 +23300,7 @@
                     <a:p>
                       <a:pPr algn="ctr"/>
                       <a:r>
-                        <a:rPr lang="fr-CA" sz="1200" dirty="0">
-                          <a:latin typeface="Courier" pitchFamily="2" charset="0"/>
-                        </a:rPr>
-                        <a:t>1</a:t>
-                      </a:r>
-                    </a:p>
-                  </a:txBody>
-                  <a:tcPr/>
-                </a:tc>
-                <a:tc>
-                  <a:txBody>
-                    <a:bodyPr/>
-                    <a:lstStyle/>
-                    <a:p>
-                      <a:pPr algn="ctr"/>
-                      <a:r>
-                        <a:rPr lang="fr-CA" sz="1200" dirty="0">
-                          <a:latin typeface="Courier" pitchFamily="2" charset="0"/>
-                        </a:rPr>
-                        <a:t>1</a:t>
-                      </a:r>
-                    </a:p>
-                  </a:txBody>
-                  <a:tcPr/>
-                </a:tc>
-                <a:extLst>
-                  <a:ext uri="{0D108BD9-81ED-4DB2-BD59-A6C34878D82A}">
-                    <a16:rowId xmlns:a16="http://schemas.microsoft.com/office/drawing/2014/main" val="1084043891"/>
-                  </a:ext>
-                </a:extLst>
-              </a:tr>
-              <a:tr h="320780">
-                <a:tc>
-                  <a:txBody>
-                    <a:bodyPr/>
-                    <a:lstStyle/>
-                    <a:p>
-                      <a:pPr algn="ctr"/>
-                      <a:r>
-                        <a:rPr lang="fr-CA" sz="1200" dirty="0">
-                          <a:latin typeface="Courier" pitchFamily="2" charset="0"/>
-                        </a:rPr>
-                        <a:t>1:3</a:t>
-                      </a:r>
-                    </a:p>
-                  </a:txBody>
-                  <a:tcPr/>
-                </a:tc>
-                <a:tc>
-                  <a:txBody>
-                    <a:bodyPr/>
-                    <a:lstStyle/>
-                    <a:p>
-                      <a:pPr algn="ctr"/>
-                      <a:r>
-                        <a:rPr lang="fr-CA" sz="1200" dirty="0">
-                          <a:latin typeface="Courier" pitchFamily="2" charset="0"/>
-                        </a:rPr>
-                        <a:t>1:2</a:t>
-                      </a:r>
-                    </a:p>
-                  </a:txBody>
-                  <a:tcPr/>
-                </a:tc>
-                <a:extLst>
-                  <a:ext uri="{0D108BD9-81ED-4DB2-BD59-A6C34878D82A}">
-                    <a16:rowId xmlns:a16="http://schemas.microsoft.com/office/drawing/2014/main" val="2017206795"/>
-                  </a:ext>
-                </a:extLst>
-              </a:tr>
-              <a:tr h="320780">
-                <a:tc>
-                  <a:txBody>
-                    <a:bodyPr/>
-                    <a:lstStyle/>
-                    <a:p>
-                      <a:pPr algn="ctr"/>
-                      <a:r>
-                        <a:rPr lang="fr-CA" sz="1200" dirty="0">
-                          <a:latin typeface="Courier" pitchFamily="2" charset="0"/>
-                        </a:rPr>
-                        <a:t>c(1, 4)</a:t>
-                      </a:r>
-                    </a:p>
-                  </a:txBody>
-                  <a:tcPr/>
-                </a:tc>
-                <a:tc>
-                  <a:txBody>
-                    <a:bodyPr/>
-                    <a:lstStyle/>
-                    <a:p>
-                      <a:pPr algn="ctr"/>
-                      <a:r>
-                        <a:rPr lang="fr-CA" sz="1200" dirty="0">
-                          <a:latin typeface="Courier" pitchFamily="2" charset="0"/>
-                        </a:rPr>
-                        <a:t>c(1, 2)</a:t>
-                      </a:r>
-                    </a:p>
-                  </a:txBody>
-                  <a:tcPr/>
-                </a:tc>
-                <a:extLst>
-                  <a:ext uri="{0D108BD9-81ED-4DB2-BD59-A6C34878D82A}">
-                    <a16:rowId xmlns:a16="http://schemas.microsoft.com/office/drawing/2014/main" val="1078201899"/>
-                  </a:ext>
-                </a:extLst>
-              </a:tr>
-              <a:tr h="320780">
-                <a:tc>
-                  <a:txBody>
-                    <a:bodyPr/>
-                    <a:lstStyle/>
-                    <a:p>
-                      <a:pPr algn="ctr"/>
-                      <a:r>
-                        <a:rPr lang="fr-CA" sz="1200" dirty="0">
+                        <a:rPr lang="fr-CA" sz="2400" dirty="0">
                           <a:highlight>
                             <a:srgbClr val="FFFF00"/>
                           </a:highlight>
@@ -24012,7 +23319,7 @@
                     <a:p>
                       <a:pPr algn="ctr"/>
                       <a:r>
-                        <a:rPr lang="fr-CA" sz="1200" dirty="0">
+                        <a:rPr lang="fr-CA" sz="2400" dirty="0">
                           <a:highlight>
                             <a:srgbClr val="FFFF00"/>
                           </a:highlight>
@@ -24021,7 +23328,7 @@
                         <a:t>`</a:t>
                       </a:r>
                       <a:r>
-                        <a:rPr lang="fr-CA" sz="1200" dirty="0" err="1">
+                        <a:rPr lang="fr-CA" sz="2400" dirty="0" err="1">
                           <a:highlight>
                             <a:srgbClr val="FFFF00"/>
                           </a:highlight>
@@ -24030,7 +23337,7 @@
                         <a:t>auteur.trice</a:t>
                       </a:r>
                       <a:r>
-                        <a:rPr lang="fr-CA" sz="1200" dirty="0">
+                        <a:rPr lang="fr-CA" sz="2400" dirty="0">
                           <a:highlight>
                             <a:srgbClr val="FFFF00"/>
                           </a:highlight>
@@ -24045,69 +23352,6 @@
                 <a:extLst>
                   <a:ext uri="{0D108BD9-81ED-4DB2-BD59-A6C34878D82A}">
                     <a16:rowId xmlns:a16="http://schemas.microsoft.com/office/drawing/2014/main" val="3399532434"/>
-                  </a:ext>
-                </a:extLst>
-              </a:tr>
-              <a:tr h="361217">
-                <a:tc>
-                  <a:txBody>
-                    <a:bodyPr/>
-                    <a:lstStyle/>
-                    <a:p>
-                      <a:pPr algn="ctr"/>
-                      <a:r>
-                        <a:rPr lang="fr-CA" sz="1200" dirty="0">
-                          <a:latin typeface="Courier" pitchFamily="2" charset="0"/>
-                        </a:rPr>
-                        <a:t>c(1, 3)</a:t>
-                      </a:r>
-                    </a:p>
-                  </a:txBody>
-                  <a:tcPr/>
-                </a:tc>
-                <a:tc>
-                  <a:txBody>
-                    <a:bodyPr/>
-                    <a:lstStyle/>
-                    <a:p>
-                      <a:pPr algn="ctr"/>
-                      <a:r>
-                        <a:rPr lang="fr-CA" sz="1200" dirty="0">
-                          <a:latin typeface="Courier" pitchFamily="2" charset="0"/>
-                        </a:rPr>
-                        <a:t>c(`</a:t>
-                      </a:r>
-                      <a:r>
-                        <a:rPr lang="fr-CA" sz="1200" dirty="0" err="1">
-                          <a:latin typeface="Courier" pitchFamily="2" charset="0"/>
-                        </a:rPr>
-                        <a:t>oeuvre</a:t>
-                      </a:r>
-                      <a:r>
-                        <a:rPr lang="fr-CA" sz="1200" dirty="0">
-                          <a:latin typeface="Courier" pitchFamily="2" charset="0"/>
-                        </a:rPr>
-                        <a:t>`, `</a:t>
-                      </a:r>
-                      <a:r>
-                        <a:rPr lang="fr-CA" sz="1200" dirty="0" err="1">
-                          <a:latin typeface="Courier" pitchFamily="2" charset="0"/>
-                        </a:rPr>
-                        <a:t>est.femme</a:t>
-                      </a:r>
-                      <a:r>
-                        <a:rPr lang="fr-CA" sz="1200" dirty="0">
-                          <a:latin typeface="Courier" pitchFamily="2" charset="0"/>
-                        </a:rPr>
-                        <a:t>`)</a:t>
-                      </a:r>
-                    </a:p>
-                  </a:txBody>
-                  <a:tcPr/>
-                </a:tc>
-                <a:extLst>
-                  <a:ext uri="{0D108BD9-81ED-4DB2-BD59-A6C34878D82A}">
-                    <a16:rowId xmlns:a16="http://schemas.microsoft.com/office/drawing/2014/main" val="3336460639"/>
                   </a:ext>
                 </a:extLst>
               </a:tr>
@@ -24968,14 +24212,14 @@
           <p:nvPr>
             <p:extLst>
               <p:ext uri="{D42A27DB-BD31-4B8C-83A1-F6EECF244321}">
-                <p14:modId xmlns:p14="http://schemas.microsoft.com/office/powerpoint/2010/main" val="1497500529"/>
+                <p14:modId xmlns:p14="http://schemas.microsoft.com/office/powerpoint/2010/main" val="3238695132"/>
               </p:ext>
             </p:extLst>
           </p:nvPr>
         </p:nvGraphicFramePr>
         <p:xfrm>
-          <a:off x="4980237" y="1579999"/>
-          <a:ext cx="5114380" cy="1644337"/>
+          <a:off x="4738209" y="2131883"/>
+          <a:ext cx="5767000" cy="361217"/>
         </p:xfrm>
         <a:graphic>
           <a:graphicData uri="http://schemas.openxmlformats.org/drawingml/2006/table">
@@ -24984,14 +24228,14 @@
                 <a:tableStyleId>{2D5ABB26-0587-4C30-8999-92F81FD0307C}</a:tableStyleId>
               </a:tblPr>
               <a:tblGrid>
-                <a:gridCol w="2557190">
+                <a:gridCol w="2883500">
                   <a:extLst>
                     <a:ext uri="{9D8B030D-6E8A-4147-A177-3AD203B41FA5}">
                       <a16:colId xmlns:a16="http://schemas.microsoft.com/office/drawing/2014/main" val="879718433"/>
                     </a:ext>
                   </a:extLst>
                 </a:gridCol>
-                <a:gridCol w="2557190">
+                <a:gridCol w="2883500">
                   <a:extLst>
                     <a:ext uri="{9D8B030D-6E8A-4147-A177-3AD203B41FA5}">
                       <a16:colId xmlns:a16="http://schemas.microsoft.com/office/drawing/2014/main" val="2059953055"/>
@@ -24999,174 +24243,6 @@
                   </a:extLst>
                 </a:gridCol>
               </a:tblGrid>
-              <a:tr h="320780">
-                <a:tc>
-                  <a:txBody>
-                    <a:bodyPr/>
-                    <a:lstStyle/>
-                    <a:p>
-                      <a:pPr algn="ctr"/>
-                      <a:r>
-                        <a:rPr lang="fr-CA" sz="1200" dirty="0">
-                          <a:latin typeface="Courier" pitchFamily="2" charset="0"/>
-                        </a:rPr>
-                        <a:t>1</a:t>
-                      </a:r>
-                    </a:p>
-                  </a:txBody>
-                  <a:tcPr/>
-                </a:tc>
-                <a:tc>
-                  <a:txBody>
-                    <a:bodyPr/>
-                    <a:lstStyle/>
-                    <a:p>
-                      <a:pPr algn="ctr"/>
-                      <a:r>
-                        <a:rPr lang="fr-CA" sz="1200" dirty="0">
-                          <a:latin typeface="Courier" pitchFamily="2" charset="0"/>
-                        </a:rPr>
-                        <a:t>1</a:t>
-                      </a:r>
-                    </a:p>
-                  </a:txBody>
-                  <a:tcPr/>
-                </a:tc>
-                <a:extLst>
-                  <a:ext uri="{0D108BD9-81ED-4DB2-BD59-A6C34878D82A}">
-                    <a16:rowId xmlns:a16="http://schemas.microsoft.com/office/drawing/2014/main" val="1084043891"/>
-                  </a:ext>
-                </a:extLst>
-              </a:tr>
-              <a:tr h="320780">
-                <a:tc>
-                  <a:txBody>
-                    <a:bodyPr/>
-                    <a:lstStyle/>
-                    <a:p>
-                      <a:pPr algn="ctr"/>
-                      <a:r>
-                        <a:rPr lang="fr-CA" sz="1200" dirty="0">
-                          <a:latin typeface="Courier" pitchFamily="2" charset="0"/>
-                        </a:rPr>
-                        <a:t>1:3</a:t>
-                      </a:r>
-                    </a:p>
-                  </a:txBody>
-                  <a:tcPr/>
-                </a:tc>
-                <a:tc>
-                  <a:txBody>
-                    <a:bodyPr/>
-                    <a:lstStyle/>
-                    <a:p>
-                      <a:pPr algn="ctr"/>
-                      <a:r>
-                        <a:rPr lang="fr-CA" sz="1200" dirty="0">
-                          <a:latin typeface="Courier" pitchFamily="2" charset="0"/>
-                        </a:rPr>
-                        <a:t>1:2</a:t>
-                      </a:r>
-                    </a:p>
-                  </a:txBody>
-                  <a:tcPr/>
-                </a:tc>
-                <a:extLst>
-                  <a:ext uri="{0D108BD9-81ED-4DB2-BD59-A6C34878D82A}">
-                    <a16:rowId xmlns:a16="http://schemas.microsoft.com/office/drawing/2014/main" val="2017206795"/>
-                  </a:ext>
-                </a:extLst>
-              </a:tr>
-              <a:tr h="320780">
-                <a:tc>
-                  <a:txBody>
-                    <a:bodyPr/>
-                    <a:lstStyle/>
-                    <a:p>
-                      <a:pPr algn="ctr"/>
-                      <a:r>
-                        <a:rPr lang="fr-CA" sz="1200" dirty="0">
-                          <a:latin typeface="Courier" pitchFamily="2" charset="0"/>
-                        </a:rPr>
-                        <a:t>c(1, 4)</a:t>
-                      </a:r>
-                    </a:p>
-                  </a:txBody>
-                  <a:tcPr/>
-                </a:tc>
-                <a:tc>
-                  <a:txBody>
-                    <a:bodyPr/>
-                    <a:lstStyle/>
-                    <a:p>
-                      <a:pPr algn="ctr"/>
-                      <a:r>
-                        <a:rPr lang="fr-CA" sz="1200" dirty="0">
-                          <a:latin typeface="Courier" pitchFamily="2" charset="0"/>
-                        </a:rPr>
-                        <a:t>c(1, 2)</a:t>
-                      </a:r>
-                    </a:p>
-                  </a:txBody>
-                  <a:tcPr/>
-                </a:tc>
-                <a:extLst>
-                  <a:ext uri="{0D108BD9-81ED-4DB2-BD59-A6C34878D82A}">
-                    <a16:rowId xmlns:a16="http://schemas.microsoft.com/office/drawing/2014/main" val="1078201899"/>
-                  </a:ext>
-                </a:extLst>
-              </a:tr>
-              <a:tr h="320780">
-                <a:tc>
-                  <a:txBody>
-                    <a:bodyPr/>
-                    <a:lstStyle/>
-                    <a:p>
-                      <a:pPr algn="ctr"/>
-                      <a:r>
-                        <a:rPr lang="fr-CA" sz="1200" dirty="0">
-                          <a:latin typeface="Courier" pitchFamily="2" charset="0"/>
-                        </a:rPr>
-                        <a:t>2</a:t>
-                      </a:r>
-                    </a:p>
-                  </a:txBody>
-                  <a:tcPr/>
-                </a:tc>
-                <a:tc>
-                  <a:txBody>
-                    <a:bodyPr/>
-                    <a:lstStyle/>
-                    <a:p>
-                      <a:pPr algn="ctr"/>
-                      <a:r>
-                        <a:rPr lang="fr-CA" sz="1200" dirty="0">
-                          <a:latin typeface="Courier" pitchFamily="2" charset="0"/>
-                        </a:rPr>
-                        <a:t>`</a:t>
-                      </a:r>
-                      <a:r>
-                        <a:rPr lang="fr-CA" sz="1200" dirty="0" err="1">
-                          <a:latin typeface="Courier" pitchFamily="2" charset="0"/>
-                        </a:rPr>
-                        <a:t>auteur.trice</a:t>
-                      </a:r>
-                      <a:r>
-                        <a:rPr lang="fr-CA" sz="1200" dirty="0">
-                          <a:latin typeface="Courier" pitchFamily="2" charset="0"/>
-                        </a:rPr>
-                        <a:t>` </a:t>
-                      </a:r>
-                    </a:p>
-                  </a:txBody>
-                  <a:tcPr/>
-                </a:tc>
-                <a:extLst>
-                  <a:ext uri="{0D108BD9-81ED-4DB2-BD59-A6C34878D82A}">
-                    <a16:rowId xmlns:a16="http://schemas.microsoft.com/office/drawing/2014/main" val="3399532434"/>
-                  </a:ext>
-                </a:extLst>
-              </a:tr>
               <a:tr h="361217">
                 <a:tc>
                   <a:txBody>
@@ -25175,7 +24251,7 @@
                     <a:p>
                       <a:pPr algn="ctr"/>
                       <a:r>
-                        <a:rPr lang="fr-CA" sz="1200" dirty="0">
+                        <a:rPr lang="fr-CA" sz="1400" dirty="0">
                           <a:highlight>
                             <a:srgbClr val="FFFF00"/>
                           </a:highlight>
@@ -25194,7 +24270,7 @@
                     <a:p>
                       <a:pPr algn="ctr"/>
                       <a:r>
-                        <a:rPr lang="fr-CA" sz="1200" dirty="0">
+                        <a:rPr lang="fr-CA" sz="1400" dirty="0">
                           <a:highlight>
                             <a:srgbClr val="FFFF00"/>
                           </a:highlight>
@@ -25203,7 +24279,7 @@
                         <a:t>c(`</a:t>
                       </a:r>
                       <a:r>
-                        <a:rPr lang="fr-CA" sz="1200" dirty="0" err="1">
+                        <a:rPr lang="fr-CA" sz="1400" dirty="0" err="1">
                           <a:highlight>
                             <a:srgbClr val="FFFF00"/>
                           </a:highlight>
@@ -25212,7 +24288,7 @@
                         <a:t>oeuvre</a:t>
                       </a:r>
                       <a:r>
-                        <a:rPr lang="fr-CA" sz="1200" dirty="0">
+                        <a:rPr lang="fr-CA" sz="1400" dirty="0">
                           <a:highlight>
                             <a:srgbClr val="FFFF00"/>
                           </a:highlight>
@@ -25221,7 +24297,7 @@
                         <a:t>`, `</a:t>
                       </a:r>
                       <a:r>
-                        <a:rPr lang="fr-CA" sz="1200" dirty="0" err="1">
+                        <a:rPr lang="fr-CA" sz="1400" dirty="0" err="1">
                           <a:highlight>
                             <a:srgbClr val="FFFF00"/>
                           </a:highlight>
@@ -25230,7 +24306,7 @@
                         <a:t>est.femme</a:t>
                       </a:r>
                       <a:r>
-                        <a:rPr lang="fr-CA" sz="1200" dirty="0">
+                        <a:rPr lang="fr-CA" sz="1400" dirty="0">
                           <a:highlight>
                             <a:srgbClr val="FFFF00"/>
                           </a:highlight>
@@ -25595,14 +24671,14 @@
                 <a:latin typeface="American Typewriter" panose="02090604020004020304" pitchFamily="18" charset="77"/>
                 <a:cs typeface="Arial" panose="020B0604020202020204" pitchFamily="34" charset="0"/>
               </a:rPr>
-              <a:t>       </a:t>
+              <a:t>       	</a:t>
             </a:r>
             <a:r>
               <a:rPr lang="fr-CA" dirty="0" err="1">
                 <a:latin typeface="American Typewriter" panose="02090604020004020304" pitchFamily="18" charset="77"/>
                 <a:cs typeface="Arial" panose="020B0604020202020204" pitchFamily="34" charset="0"/>
               </a:rPr>
-              <a:t>corpus_xyz</a:t>
+              <a:t>xyz</a:t>
             </a:r>
             <a:r>
               <a:rPr lang="fr-CA" dirty="0">
@@ -26037,7 +25113,7 @@
                 <a:latin typeface="American Typewriter" panose="02090604020004020304" pitchFamily="18" charset="77"/>
                 <a:cs typeface="Arial" panose="020B0604020202020204" pitchFamily="34" charset="0"/>
               </a:rPr>
-              <a:t>URI</a:t>
+              <a:t>auteur.trice</a:t>
             </a:r>
             <a:r>
               <a:rPr lang="fr-CA" dirty="0">
@@ -26135,7 +25211,7 @@
         </p:nvSpPr>
         <p:spPr>
           <a:xfrm>
-            <a:off x="4162749" y="4340550"/>
+            <a:off x="5294313" y="4334338"/>
             <a:ext cx="333633" cy="358346"/>
           </a:xfrm>
           <a:prstGeom prst="upArrow">
@@ -26184,7 +25260,7 @@
         </p:nvSpPr>
         <p:spPr>
           <a:xfrm rot="5400000">
-            <a:off x="5929183" y="3588409"/>
+            <a:off x="6125674" y="3585451"/>
             <a:ext cx="333633" cy="358346"/>
           </a:xfrm>
           <a:prstGeom prst="upArrow">
@@ -26274,7 +25350,7 @@
         </p:nvSpPr>
         <p:spPr>
           <a:xfrm>
-            <a:off x="3701245" y="4861476"/>
+            <a:off x="4665993" y="4855655"/>
             <a:ext cx="1590274" cy="307777"/>
           </a:xfrm>
           <a:prstGeom prst="rect">
@@ -30124,8 +29200,10 @@
             </a:r>
           </a:p>
           <a:p>
-            <a:pPr lvl="1"/>
-            <a:endParaRPr lang="fr-CA" dirty="0"/>
+            <a:r>
+              <a:rPr lang="fr-CA" dirty="0"/>
+              <a:t>Temps requis</a:t>
+            </a:r>
           </a:p>
           <a:p>
             <a:endParaRPr lang="fr-CA" dirty="0"/>
@@ -30227,7 +29305,7 @@
           <a:p>
             <a:r>
               <a:rPr lang="fr-CA" dirty="0"/>
-              <a:t>Coût nul</a:t>
+              <a:t>Coût réduit</a:t>
             </a:r>
           </a:p>
           <a:p>

</xml_diff>

<commit_message>
Mise à jour de l'atelier pour enseignement
</commit_message>
<xml_diff>
--- a/Introduction_EDA_R.pptx
+++ b/Introduction_EDA_R.pptx
@@ -13,8 +13,8 @@
     <p:sldId id="330" r:id="rId4"/>
     <p:sldId id="261" r:id="rId5"/>
     <p:sldId id="260" r:id="rId6"/>
-    <p:sldId id="259" r:id="rId7"/>
-    <p:sldId id="331" r:id="rId8"/>
+    <p:sldId id="331" r:id="rId7"/>
+    <p:sldId id="259" r:id="rId8"/>
     <p:sldId id="317" r:id="rId9"/>
     <p:sldId id="287" r:id="rId10"/>
     <p:sldId id="288" r:id="rId11"/>
@@ -144,8 +144,8 @@
             <p14:sldId id="330"/>
             <p14:sldId id="261"/>
             <p14:sldId id="260"/>
+            <p14:sldId id="331"/>
             <p14:sldId id="259"/>
-            <p14:sldId id="331"/>
             <p14:sldId id="317"/>
             <p14:sldId id="287"/>
             <p14:sldId id="288"/>
@@ -28659,6 +28659,248 @@
 <file path=ppt/slides/slide6.xml><?xml version="1.0" encoding="utf-8"?>
 <p:sld xmlns:a="http://schemas.openxmlformats.org/drawingml/2006/main" xmlns:r="http://schemas.openxmlformats.org/officeDocument/2006/relationships" xmlns:p="http://schemas.openxmlformats.org/presentationml/2006/main">
   <p:cSld>
+    <p:spTree>
+      <p:nvGrpSpPr>
+        <p:cNvPr id="1" name=""/>
+        <p:cNvGrpSpPr/>
+        <p:nvPr/>
+      </p:nvGrpSpPr>
+      <p:grpSpPr>
+        <a:xfrm>
+          <a:off x="0" y="0"/>
+          <a:ext cx="0" cy="0"/>
+          <a:chOff x="0" y="0"/>
+          <a:chExt cx="0" cy="0"/>
+        </a:xfrm>
+      </p:grpSpPr>
+      <p:sp>
+        <p:nvSpPr>
+          <p:cNvPr id="4" name="Titre 3">
+            <a:extLst>
+              <a:ext uri="{FF2B5EF4-FFF2-40B4-BE49-F238E27FC236}">
+                <a16:creationId xmlns:a16="http://schemas.microsoft.com/office/drawing/2014/main" id="{165F55D0-01C7-4AA7-949A-A880D56A9DEB}"/>
+              </a:ext>
+            </a:extLst>
+          </p:cNvPr>
+          <p:cNvSpPr>
+            <a:spLocks noGrp="1"/>
+          </p:cNvSpPr>
+          <p:nvPr>
+            <p:ph type="title"/>
+          </p:nvPr>
+        </p:nvSpPr>
+        <p:spPr/>
+        <p:txBody>
+          <a:bodyPr/>
+          <a:lstStyle/>
+          <a:p>
+            <a:r>
+              <a:rPr lang="fr-CA" dirty="0"/>
+              <a:t>Ouvrir maintenant votre navigateur</a:t>
+            </a:r>
+          </a:p>
+        </p:txBody>
+      </p:sp>
+      <p:sp>
+        <p:nvSpPr>
+          <p:cNvPr id="5" name="Espace réservé du texte 4">
+            <a:extLst>
+              <a:ext uri="{FF2B5EF4-FFF2-40B4-BE49-F238E27FC236}">
+                <a16:creationId xmlns:a16="http://schemas.microsoft.com/office/drawing/2014/main" id="{CCB8861C-800E-C35F-5B3C-481916BF2A5B}"/>
+              </a:ext>
+            </a:extLst>
+          </p:cNvPr>
+          <p:cNvSpPr>
+            <a:spLocks noGrp="1"/>
+          </p:cNvSpPr>
+          <p:nvPr>
+            <p:ph type="body" idx="1"/>
+          </p:nvPr>
+        </p:nvSpPr>
+        <p:spPr/>
+        <p:txBody>
+          <a:bodyPr/>
+          <a:lstStyle/>
+          <a:p>
+            <a:r>
+              <a:rPr lang="fr-CA" dirty="0"/>
+              <a:t>Fenêtre 1: POSIT-Cloud</a:t>
+            </a:r>
+          </a:p>
+        </p:txBody>
+      </p:sp>
+      <p:sp>
+        <p:nvSpPr>
+          <p:cNvPr id="6" name="Espace réservé du contenu 5">
+            <a:extLst>
+              <a:ext uri="{FF2B5EF4-FFF2-40B4-BE49-F238E27FC236}">
+                <a16:creationId xmlns:a16="http://schemas.microsoft.com/office/drawing/2014/main" id="{601737A8-9279-ACDC-E169-1FD732F2921F}"/>
+              </a:ext>
+            </a:extLst>
+          </p:cNvPr>
+          <p:cNvSpPr>
+            <a:spLocks noGrp="1"/>
+          </p:cNvSpPr>
+          <p:nvPr>
+            <p:ph sz="half" idx="2"/>
+          </p:nvPr>
+        </p:nvSpPr>
+        <p:spPr/>
+        <p:txBody>
+          <a:bodyPr/>
+          <a:lstStyle/>
+          <a:p>
+            <a:r>
+              <a:rPr lang="fr-CA" dirty="0"/>
+              <a:t>Interface </a:t>
+            </a:r>
+            <a:r>
+              <a:rPr lang="fr-CA" dirty="0" err="1"/>
+              <a:t>RStudio</a:t>
+            </a:r>
+            <a:endParaRPr lang="fr-CA" dirty="0"/>
+          </a:p>
+          <a:p>
+            <a:pPr marL="0" indent="0">
+              <a:buNone/>
+            </a:pPr>
+            <a:endParaRPr lang="fr-CA" dirty="0"/>
+          </a:p>
+          <a:p>
+            <a:pPr marL="0" indent="0">
+              <a:buNone/>
+            </a:pPr>
+            <a:r>
+              <a:rPr lang="fr-CA" dirty="0">
+                <a:highlight>
+                  <a:srgbClr val="FFFF00"/>
+                </a:highlight>
+              </a:rPr>
+              <a:t>https://posit.cloud/</a:t>
+            </a:r>
+          </a:p>
+          <a:p>
+            <a:pPr marL="0" indent="0">
+              <a:buNone/>
+            </a:pPr>
+            <a:endParaRPr lang="fr-CA" dirty="0"/>
+          </a:p>
+        </p:txBody>
+      </p:sp>
+      <p:sp>
+        <p:nvSpPr>
+          <p:cNvPr id="7" name="Espace réservé du texte 6">
+            <a:extLst>
+              <a:ext uri="{FF2B5EF4-FFF2-40B4-BE49-F238E27FC236}">
+                <a16:creationId xmlns:a16="http://schemas.microsoft.com/office/drawing/2014/main" id="{E21FE5F3-AB0C-BE5A-D0D4-0054B14A3930}"/>
+              </a:ext>
+            </a:extLst>
+          </p:cNvPr>
+          <p:cNvSpPr>
+            <a:spLocks noGrp="1"/>
+          </p:cNvSpPr>
+          <p:nvPr>
+            <p:ph type="body" sz="quarter" idx="3"/>
+          </p:nvPr>
+        </p:nvSpPr>
+        <p:spPr/>
+        <p:txBody>
+          <a:bodyPr/>
+          <a:lstStyle/>
+          <a:p>
+            <a:r>
+              <a:rPr lang="fr-CA" dirty="0"/>
+              <a:t>Fenêtre 2: </a:t>
+            </a:r>
+            <a:r>
+              <a:rPr lang="fr-CA" dirty="0" err="1"/>
+              <a:t>Github</a:t>
+            </a:r>
+            <a:endParaRPr lang="fr-CA" dirty="0"/>
+          </a:p>
+        </p:txBody>
+      </p:sp>
+      <p:sp>
+        <p:nvSpPr>
+          <p:cNvPr id="8" name="Espace réservé du contenu 7">
+            <a:extLst>
+              <a:ext uri="{FF2B5EF4-FFF2-40B4-BE49-F238E27FC236}">
+                <a16:creationId xmlns:a16="http://schemas.microsoft.com/office/drawing/2014/main" id="{74385B60-9F7F-C58A-3CDB-E330008EFAC4}"/>
+              </a:ext>
+            </a:extLst>
+          </p:cNvPr>
+          <p:cNvSpPr>
+            <a:spLocks noGrp="1"/>
+          </p:cNvSpPr>
+          <p:nvPr>
+            <p:ph sz="quarter" idx="4"/>
+          </p:nvPr>
+        </p:nvSpPr>
+        <p:spPr/>
+        <p:txBody>
+          <a:bodyPr/>
+          <a:lstStyle/>
+          <a:p>
+            <a:r>
+              <a:rPr lang="fr-CA" dirty="0"/>
+              <a:t>Projet à importer dans </a:t>
+            </a:r>
+            <a:r>
+              <a:rPr lang="fr-CA" dirty="0" err="1"/>
+              <a:t>RStudio</a:t>
+            </a:r>
+            <a:endParaRPr lang="fr-CA" dirty="0"/>
+          </a:p>
+          <a:p>
+            <a:endParaRPr lang="fr-CA" dirty="0"/>
+          </a:p>
+          <a:p>
+            <a:pPr marL="0" indent="0">
+              <a:buNone/>
+            </a:pPr>
+            <a:r>
+              <a:rPr lang="fr-CA" dirty="0">
+                <a:highlight>
+                  <a:srgbClr val="FFFF00"/>
+                </a:highlight>
+              </a:rPr>
+              <a:t>https://</a:t>
+            </a:r>
+            <a:r>
+              <a:rPr lang="fr-CA" dirty="0" err="1">
+                <a:highlight>
+                  <a:srgbClr val="FFFF00"/>
+                </a:highlight>
+              </a:rPr>
+              <a:t>github.com</a:t>
+            </a:r>
+            <a:r>
+              <a:rPr lang="fr-CA" dirty="0">
+                <a:highlight>
+                  <a:srgbClr val="FFFF00"/>
+                </a:highlight>
+              </a:rPr>
+              <a:t>/pbriss7/20230223_PB_atelier_ladirec_exploration_textes_R</a:t>
+            </a:r>
+          </a:p>
+        </p:txBody>
+      </p:sp>
+    </p:spTree>
+    <p:extLst>
+      <p:ext uri="{BB962C8B-B14F-4D97-AF65-F5344CB8AC3E}">
+        <p14:creationId xmlns:p14="http://schemas.microsoft.com/office/powerpoint/2010/main" val="2517642604"/>
+      </p:ext>
+    </p:extLst>
+  </p:cSld>
+  <p:clrMapOvr>
+    <a:masterClrMapping/>
+  </p:clrMapOvr>
+</p:sld>
+</file>
+
+<file path=ppt/slides/slide7.xml><?xml version="1.0" encoding="utf-8"?>
+<p:sld xmlns:a="http://schemas.openxmlformats.org/drawingml/2006/main" xmlns:r="http://schemas.openxmlformats.org/officeDocument/2006/relationships" xmlns:p="http://schemas.openxmlformats.org/presentationml/2006/main">
+  <p:cSld>
     <p:bg>
       <p:bgPr>
         <a:solidFill>
@@ -29005,248 +29247,6 @@
     <p:extLst>
       <p:ext uri="{BB962C8B-B14F-4D97-AF65-F5344CB8AC3E}">
         <p14:creationId xmlns:p14="http://schemas.microsoft.com/office/powerpoint/2010/main" val="825984011"/>
-      </p:ext>
-    </p:extLst>
-  </p:cSld>
-  <p:clrMapOvr>
-    <a:masterClrMapping/>
-  </p:clrMapOvr>
-</p:sld>
-</file>
-
-<file path=ppt/slides/slide7.xml><?xml version="1.0" encoding="utf-8"?>
-<p:sld xmlns:a="http://schemas.openxmlformats.org/drawingml/2006/main" xmlns:r="http://schemas.openxmlformats.org/officeDocument/2006/relationships" xmlns:p="http://schemas.openxmlformats.org/presentationml/2006/main">
-  <p:cSld>
-    <p:spTree>
-      <p:nvGrpSpPr>
-        <p:cNvPr id="1" name=""/>
-        <p:cNvGrpSpPr/>
-        <p:nvPr/>
-      </p:nvGrpSpPr>
-      <p:grpSpPr>
-        <a:xfrm>
-          <a:off x="0" y="0"/>
-          <a:ext cx="0" cy="0"/>
-          <a:chOff x="0" y="0"/>
-          <a:chExt cx="0" cy="0"/>
-        </a:xfrm>
-      </p:grpSpPr>
-      <p:sp>
-        <p:nvSpPr>
-          <p:cNvPr id="4" name="Titre 3">
-            <a:extLst>
-              <a:ext uri="{FF2B5EF4-FFF2-40B4-BE49-F238E27FC236}">
-                <a16:creationId xmlns:a16="http://schemas.microsoft.com/office/drawing/2014/main" id="{165F55D0-01C7-4AA7-949A-A880D56A9DEB}"/>
-              </a:ext>
-            </a:extLst>
-          </p:cNvPr>
-          <p:cNvSpPr>
-            <a:spLocks noGrp="1"/>
-          </p:cNvSpPr>
-          <p:nvPr>
-            <p:ph type="title"/>
-          </p:nvPr>
-        </p:nvSpPr>
-        <p:spPr/>
-        <p:txBody>
-          <a:bodyPr/>
-          <a:lstStyle/>
-          <a:p>
-            <a:r>
-              <a:rPr lang="fr-CA" dirty="0"/>
-              <a:t>Ouvrir maintenant votre navigateur</a:t>
-            </a:r>
-          </a:p>
-        </p:txBody>
-      </p:sp>
-      <p:sp>
-        <p:nvSpPr>
-          <p:cNvPr id="5" name="Espace réservé du texte 4">
-            <a:extLst>
-              <a:ext uri="{FF2B5EF4-FFF2-40B4-BE49-F238E27FC236}">
-                <a16:creationId xmlns:a16="http://schemas.microsoft.com/office/drawing/2014/main" id="{CCB8861C-800E-C35F-5B3C-481916BF2A5B}"/>
-              </a:ext>
-            </a:extLst>
-          </p:cNvPr>
-          <p:cNvSpPr>
-            <a:spLocks noGrp="1"/>
-          </p:cNvSpPr>
-          <p:nvPr>
-            <p:ph type="body" idx="1"/>
-          </p:nvPr>
-        </p:nvSpPr>
-        <p:spPr/>
-        <p:txBody>
-          <a:bodyPr/>
-          <a:lstStyle/>
-          <a:p>
-            <a:r>
-              <a:rPr lang="fr-CA" dirty="0"/>
-              <a:t>Fenêtre 1: POSIT-Cloud</a:t>
-            </a:r>
-          </a:p>
-        </p:txBody>
-      </p:sp>
-      <p:sp>
-        <p:nvSpPr>
-          <p:cNvPr id="6" name="Espace réservé du contenu 5">
-            <a:extLst>
-              <a:ext uri="{FF2B5EF4-FFF2-40B4-BE49-F238E27FC236}">
-                <a16:creationId xmlns:a16="http://schemas.microsoft.com/office/drawing/2014/main" id="{601737A8-9279-ACDC-E169-1FD732F2921F}"/>
-              </a:ext>
-            </a:extLst>
-          </p:cNvPr>
-          <p:cNvSpPr>
-            <a:spLocks noGrp="1"/>
-          </p:cNvSpPr>
-          <p:nvPr>
-            <p:ph sz="half" idx="2"/>
-          </p:nvPr>
-        </p:nvSpPr>
-        <p:spPr/>
-        <p:txBody>
-          <a:bodyPr/>
-          <a:lstStyle/>
-          <a:p>
-            <a:r>
-              <a:rPr lang="fr-CA" dirty="0"/>
-              <a:t>Interface </a:t>
-            </a:r>
-            <a:r>
-              <a:rPr lang="fr-CA" dirty="0" err="1"/>
-              <a:t>RStudio</a:t>
-            </a:r>
-            <a:endParaRPr lang="fr-CA" dirty="0"/>
-          </a:p>
-          <a:p>
-            <a:pPr marL="0" indent="0">
-              <a:buNone/>
-            </a:pPr>
-            <a:endParaRPr lang="fr-CA" dirty="0"/>
-          </a:p>
-          <a:p>
-            <a:pPr marL="0" indent="0">
-              <a:buNone/>
-            </a:pPr>
-            <a:r>
-              <a:rPr lang="fr-CA" dirty="0">
-                <a:highlight>
-                  <a:srgbClr val="FFFF00"/>
-                </a:highlight>
-              </a:rPr>
-              <a:t>https://posit.cloud/</a:t>
-            </a:r>
-          </a:p>
-          <a:p>
-            <a:pPr marL="0" indent="0">
-              <a:buNone/>
-            </a:pPr>
-            <a:endParaRPr lang="fr-CA" dirty="0"/>
-          </a:p>
-        </p:txBody>
-      </p:sp>
-      <p:sp>
-        <p:nvSpPr>
-          <p:cNvPr id="7" name="Espace réservé du texte 6">
-            <a:extLst>
-              <a:ext uri="{FF2B5EF4-FFF2-40B4-BE49-F238E27FC236}">
-                <a16:creationId xmlns:a16="http://schemas.microsoft.com/office/drawing/2014/main" id="{E21FE5F3-AB0C-BE5A-D0D4-0054B14A3930}"/>
-              </a:ext>
-            </a:extLst>
-          </p:cNvPr>
-          <p:cNvSpPr>
-            <a:spLocks noGrp="1"/>
-          </p:cNvSpPr>
-          <p:nvPr>
-            <p:ph type="body" sz="quarter" idx="3"/>
-          </p:nvPr>
-        </p:nvSpPr>
-        <p:spPr/>
-        <p:txBody>
-          <a:bodyPr/>
-          <a:lstStyle/>
-          <a:p>
-            <a:r>
-              <a:rPr lang="fr-CA" dirty="0"/>
-              <a:t>Fenêtre 2: </a:t>
-            </a:r>
-            <a:r>
-              <a:rPr lang="fr-CA" dirty="0" err="1"/>
-              <a:t>Github</a:t>
-            </a:r>
-            <a:endParaRPr lang="fr-CA" dirty="0"/>
-          </a:p>
-        </p:txBody>
-      </p:sp>
-      <p:sp>
-        <p:nvSpPr>
-          <p:cNvPr id="8" name="Espace réservé du contenu 7">
-            <a:extLst>
-              <a:ext uri="{FF2B5EF4-FFF2-40B4-BE49-F238E27FC236}">
-                <a16:creationId xmlns:a16="http://schemas.microsoft.com/office/drawing/2014/main" id="{74385B60-9F7F-C58A-3CDB-E330008EFAC4}"/>
-              </a:ext>
-            </a:extLst>
-          </p:cNvPr>
-          <p:cNvSpPr>
-            <a:spLocks noGrp="1"/>
-          </p:cNvSpPr>
-          <p:nvPr>
-            <p:ph sz="quarter" idx="4"/>
-          </p:nvPr>
-        </p:nvSpPr>
-        <p:spPr/>
-        <p:txBody>
-          <a:bodyPr/>
-          <a:lstStyle/>
-          <a:p>
-            <a:r>
-              <a:rPr lang="fr-CA" dirty="0"/>
-              <a:t>Projet à importer dans </a:t>
-            </a:r>
-            <a:r>
-              <a:rPr lang="fr-CA" dirty="0" err="1"/>
-              <a:t>RStudio</a:t>
-            </a:r>
-            <a:endParaRPr lang="fr-CA" dirty="0"/>
-          </a:p>
-          <a:p>
-            <a:endParaRPr lang="fr-CA" dirty="0"/>
-          </a:p>
-          <a:p>
-            <a:pPr marL="0" indent="0">
-              <a:buNone/>
-            </a:pPr>
-            <a:r>
-              <a:rPr lang="fr-CA" dirty="0">
-                <a:highlight>
-                  <a:srgbClr val="FFFF00"/>
-                </a:highlight>
-              </a:rPr>
-              <a:t>https://</a:t>
-            </a:r>
-            <a:r>
-              <a:rPr lang="fr-CA" dirty="0" err="1">
-                <a:highlight>
-                  <a:srgbClr val="FFFF00"/>
-                </a:highlight>
-              </a:rPr>
-              <a:t>github.com</a:t>
-            </a:r>
-            <a:r>
-              <a:rPr lang="fr-CA" dirty="0">
-                <a:highlight>
-                  <a:srgbClr val="FFFF00"/>
-                </a:highlight>
-              </a:rPr>
-              <a:t>/pbriss7/20230223_PB_atelier_ladirec_exploration_textes_R</a:t>
-            </a:r>
-          </a:p>
-        </p:txBody>
-      </p:sp>
-    </p:spTree>
-    <p:extLst>
-      <p:ext uri="{BB962C8B-B14F-4D97-AF65-F5344CB8AC3E}">
-        <p14:creationId xmlns:p14="http://schemas.microsoft.com/office/powerpoint/2010/main" val="2517642604"/>
       </p:ext>
     </p:extLst>
   </p:cSld>

</xml_diff>